<commit_message>
Issue 237: Misspelling of Acknowledgement in final slide
</commit_message>
<xml_diff>
--- a/doc/Indicator.pptx
+++ b/doc/Indicator.pptx
@@ -15,13 +15,13 @@
   <p:notesSz cx="6858000" cy="9144000"/>
   <p:embeddedFontLst>
     <p:embeddedFont>
-      <p:font typeface="Gill Sans Ultra Bold" pitchFamily="34" charset="0"/>
+      <p:font typeface="Franklin Gothic Demi" charset="0"/>
       <p:regular r:id="rId5"/>
+      <p:italic r:id="rId6"/>
     </p:embeddedFont>
     <p:embeddedFont>
-      <p:font typeface="Franklin Gothic Book" pitchFamily="34" charset="0"/>
-      <p:regular r:id="rId6"/>
-      <p:italic r:id="rId7"/>
+      <p:font typeface="Gill Sans Ultra Bold" charset="0"/>
+      <p:regular r:id="rId7"/>
     </p:embeddedFont>
     <p:embeddedFont>
       <p:font typeface="Calibri" pitchFamily="34" charset="0"/>
@@ -31,7 +31,7 @@
       <p:boldItalic r:id="rId11"/>
     </p:embeddedFont>
     <p:embeddedFont>
-      <p:font typeface="Franklin Gothic Demi" pitchFamily="34" charset="0"/>
+      <p:font typeface="Franklin Gothic Book" charset="0"/>
       <p:regular r:id="rId12"/>
       <p:italic r:id="rId13"/>
     </p:embeddedFont>
@@ -216,7 +216,7 @@
           <a:p>
             <a:fld id="{6699ACB9-486C-4D62-A3A7-AF98E13EFDA3}" type="datetimeFigureOut">
               <a:rPr lang="en-US" smtClean="0"/>
-              <a:t>12/1/2013</a:t>
+              <a:t>3/11/2014</a:t>
             </a:fld>
             <a:endParaRPr lang="en-US"/>
           </a:p>
@@ -750,7 +750,7 @@
             <a:fld id="{1D8BD707-D9CF-40AE-B4C6-C98DA3205C09}" type="datetimeFigureOut">
               <a:rPr lang="en-US" smtClean="0"/>
               <a:pPr/>
-              <a:t>12/1/2013</a:t>
+              <a:t>3/11/2014</a:t>
             </a:fld>
             <a:endParaRPr lang="en-US"/>
           </a:p>
@@ -917,7 +917,7 @@
             <a:fld id="{1D8BD707-D9CF-40AE-B4C6-C98DA3205C09}" type="datetimeFigureOut">
               <a:rPr lang="en-US" smtClean="0"/>
               <a:pPr/>
-              <a:t>12/1/2013</a:t>
+              <a:t>3/11/2014</a:t>
             </a:fld>
             <a:endParaRPr lang="en-US"/>
           </a:p>
@@ -1094,7 +1094,7 @@
             <a:fld id="{1D8BD707-D9CF-40AE-B4C6-C98DA3205C09}" type="datetimeFigureOut">
               <a:rPr lang="en-US" smtClean="0"/>
               <a:pPr/>
-              <a:t>12/1/2013</a:t>
+              <a:t>3/11/2014</a:t>
             </a:fld>
             <a:endParaRPr lang="en-US"/>
           </a:p>
@@ -1261,7 +1261,7 @@
             <a:fld id="{1D8BD707-D9CF-40AE-B4C6-C98DA3205C09}" type="datetimeFigureOut">
               <a:rPr lang="en-US" smtClean="0"/>
               <a:pPr/>
-              <a:t>12/1/2013</a:t>
+              <a:t>3/11/2014</a:t>
             </a:fld>
             <a:endParaRPr lang="en-US"/>
           </a:p>
@@ -1504,7 +1504,7 @@
             <a:fld id="{1D8BD707-D9CF-40AE-B4C6-C98DA3205C09}" type="datetimeFigureOut">
               <a:rPr lang="en-US" smtClean="0"/>
               <a:pPr/>
-              <a:t>12/1/2013</a:t>
+              <a:t>3/11/2014</a:t>
             </a:fld>
             <a:endParaRPr lang="en-US"/>
           </a:p>
@@ -1789,7 +1789,7 @@
             <a:fld id="{1D8BD707-D9CF-40AE-B4C6-C98DA3205C09}" type="datetimeFigureOut">
               <a:rPr lang="en-US" smtClean="0"/>
               <a:pPr/>
-              <a:t>12/1/2013</a:t>
+              <a:t>3/11/2014</a:t>
             </a:fld>
             <a:endParaRPr lang="en-US"/>
           </a:p>
@@ -2208,7 +2208,7 @@
             <a:fld id="{1D8BD707-D9CF-40AE-B4C6-C98DA3205C09}" type="datetimeFigureOut">
               <a:rPr lang="en-US" smtClean="0"/>
               <a:pPr/>
-              <a:t>12/1/2013</a:t>
+              <a:t>3/11/2014</a:t>
             </a:fld>
             <a:endParaRPr lang="en-US"/>
           </a:p>
@@ -2323,7 +2323,7 @@
             <a:fld id="{1D8BD707-D9CF-40AE-B4C6-C98DA3205C09}" type="datetimeFigureOut">
               <a:rPr lang="en-US" smtClean="0"/>
               <a:pPr/>
-              <a:t>12/1/2013</a:t>
+              <a:t>3/11/2014</a:t>
             </a:fld>
             <a:endParaRPr lang="en-US"/>
           </a:p>
@@ -2415,7 +2415,7 @@
             <a:fld id="{1D8BD707-D9CF-40AE-B4C6-C98DA3205C09}" type="datetimeFigureOut">
               <a:rPr lang="en-US" smtClean="0"/>
               <a:pPr/>
-              <a:t>12/1/2013</a:t>
+              <a:t>3/11/2014</a:t>
             </a:fld>
             <a:endParaRPr lang="en-US"/>
           </a:p>
@@ -2689,7 +2689,7 @@
             <a:fld id="{1D8BD707-D9CF-40AE-B4C6-C98DA3205C09}" type="datetimeFigureOut">
               <a:rPr lang="en-US" smtClean="0"/>
               <a:pPr/>
-              <a:t>12/1/2013</a:t>
+              <a:t>3/11/2014</a:t>
             </a:fld>
             <a:endParaRPr lang="en-US"/>
           </a:p>
@@ -2939,7 +2939,7 @@
             <a:fld id="{1D8BD707-D9CF-40AE-B4C6-C98DA3205C09}" type="datetimeFigureOut">
               <a:rPr lang="en-US" smtClean="0"/>
               <a:pPr/>
-              <a:t>12/1/2013</a:t>
+              <a:t>3/11/2014</a:t>
             </a:fld>
             <a:endParaRPr lang="en-US"/>
           </a:p>
@@ -3149,7 +3149,7 @@
             <a:fld id="{1D8BD707-D9CF-40AE-B4C6-C98DA3205C09}" type="datetimeFigureOut">
               <a:rPr lang="en-US" smtClean="0"/>
               <a:pPr/>
-              <a:t>12/1/2013</a:t>
+              <a:t>3/11/2014</a:t>
             </a:fld>
             <a:endParaRPr lang="en-US"/>
           </a:p>
@@ -4026,8 +4026,9 @@
             <a:pPr algn="ctr"/>
             <a:r>
               <a:rPr lang="en-US" sz="3200" b="1" dirty="0" smtClean="0"/>
-              <a:t>AKNOWLEDGEMENT</a:t>
-            </a:r>
+              <a:t>ACKNOWLEDGEMENT</a:t>
+            </a:r>
+            <a:endParaRPr lang="en-US" sz="3200" b="1" dirty="0" smtClean="0"/>
           </a:p>
           <a:p>
             <a:pPr algn="ctr"/>
@@ -4062,12 +4063,12 @@
               <a:t>a </a:t>
             </a:r>
             <a:r>
-              <a:rPr lang="en-US" sz="2400" dirty="0" err="1" smtClean="0"/>
-              <a:t>PowePoint</a:t>
-            </a:r>
-            <a:r>
               <a:rPr lang="en-US" sz="2400" dirty="0" smtClean="0"/>
-              <a:t> plugin for </a:t>
+              <a:t>PowerPoint </a:t>
+            </a:r>
+            <a:r>
+              <a:rPr lang="en-US" sz="2400" dirty="0" smtClean="0"/>
+              <a:t>plugin for </a:t>
             </a:r>
             <a:r>
               <a:rPr lang="en-US" sz="2400" dirty="0" smtClean="0">

</xml_diff>

<commit_message>
Update Acknowledgement slide to new design
</commit_message>
<xml_diff>
--- a/doc/Indicator.pptx
+++ b/doc/Indicator.pptx
@@ -15,25 +15,32 @@
   <p:notesSz cx="6858000" cy="9144000"/>
   <p:embeddedFontLst>
     <p:embeddedFont>
-      <p:font typeface="Franklin Gothic Demi" charset="0"/>
+      <p:font typeface="Segoe UI" panose="020B0502040204020203" pitchFamily="34" charset="0"/>
       <p:regular r:id="rId5"/>
-      <p:italic r:id="rId6"/>
+      <p:bold r:id="rId6"/>
+      <p:italic r:id="rId7"/>
+      <p:boldItalic r:id="rId8"/>
     </p:embeddedFont>
     <p:embeddedFont>
-      <p:font typeface="Gill Sans Ultra Bold" charset="0"/>
-      <p:regular r:id="rId7"/>
+      <p:font typeface="Franklin Gothic Demi" panose="020B0703020102020204" pitchFamily="34" charset="0"/>
+      <p:regular r:id="rId9"/>
+      <p:italic r:id="rId10"/>
     </p:embeddedFont>
     <p:embeddedFont>
-      <p:font typeface="Calibri" pitchFamily="34" charset="0"/>
-      <p:regular r:id="rId8"/>
-      <p:bold r:id="rId9"/>
-      <p:italic r:id="rId10"/>
-      <p:boldItalic r:id="rId11"/>
+      <p:font typeface="Calibri" panose="020F0502020204030204" pitchFamily="34" charset="0"/>
+      <p:regular r:id="rId11"/>
+      <p:bold r:id="rId12"/>
+      <p:italic r:id="rId13"/>
+      <p:boldItalic r:id="rId14"/>
     </p:embeddedFont>
     <p:embeddedFont>
-      <p:font typeface="Franklin Gothic Book" charset="0"/>
-      <p:regular r:id="rId12"/>
-      <p:italic r:id="rId13"/>
+      <p:font typeface="Franklin Gothic Book" panose="020B0503020102020204" pitchFamily="34" charset="0"/>
+      <p:regular r:id="rId15"/>
+      <p:italic r:id="rId16"/>
+    </p:embeddedFont>
+    <p:embeddedFont>
+      <p:font typeface="Gill Sans Ultra Bold" panose="020B0A02020104020203" pitchFamily="34" charset="0"/>
+      <p:regular r:id="rId17"/>
     </p:embeddedFont>
   </p:embeddedFontLst>
   <p:defaultTextStyle>
@@ -131,6 +138,22 @@
       </a:defRPr>
     </a:lvl9pPr>
   </p:defaultTextStyle>
+  <p:extLst>
+    <p:ext uri="{EFAFB233-063F-42B5-8137-9DF3F51BA10A}">
+      <p15:sldGuideLst xmlns:p15="http://schemas.microsoft.com/office/powerpoint/2012/main">
+        <p15:guide id="1" orient="horz" pos="2160">
+          <p15:clr>
+            <a:srgbClr val="A4A3A4"/>
+          </p15:clr>
+        </p15:guide>
+        <p15:guide id="2" pos="2880">
+          <p15:clr>
+            <a:srgbClr val="A4A3A4"/>
+          </p15:clr>
+        </p15:guide>
+      </p15:sldGuideLst>
+    </p:ext>
+  </p:extLst>
 </p:presentation>
 </file>
 
@@ -216,7 +239,7 @@
           <a:p>
             <a:fld id="{6699ACB9-486C-4D62-A3A7-AF98E13EFDA3}" type="datetimeFigureOut">
               <a:rPr lang="en-US" smtClean="0"/>
-              <a:t>3/11/2014</a:t>
+              <a:t>1/22/2017</a:t>
             </a:fld>
             <a:endParaRPr lang="en-US"/>
           </a:p>
@@ -280,38 +303,37 @@
           <a:p>
             <a:pPr lvl="0"/>
             <a:r>
-              <a:rPr lang="en-US" smtClean="0"/>
+              <a:rPr lang="en-US"/>
               <a:t>Click to edit Master text styles</a:t>
             </a:r>
           </a:p>
           <a:p>
             <a:pPr lvl="1"/>
             <a:r>
-              <a:rPr lang="en-US" smtClean="0"/>
+              <a:rPr lang="en-US"/>
               <a:t>Second level</a:t>
             </a:r>
           </a:p>
           <a:p>
             <a:pPr lvl="2"/>
             <a:r>
-              <a:rPr lang="en-US" smtClean="0"/>
+              <a:rPr lang="en-US"/>
               <a:t>Third level</a:t>
             </a:r>
           </a:p>
           <a:p>
             <a:pPr lvl="3"/>
             <a:r>
-              <a:rPr lang="en-US" smtClean="0"/>
+              <a:rPr lang="en-US"/>
               <a:t>Fourth level</a:t>
             </a:r>
           </a:p>
           <a:p>
             <a:pPr lvl="4"/>
             <a:r>
-              <a:rPr lang="en-US" smtClean="0"/>
+              <a:rPr lang="en-US"/>
               <a:t>Fifth level</a:t>
             </a:r>
-            <a:endParaRPr lang="en-US"/>
           </a:p>
         </p:txBody>
       </p:sp>
@@ -606,10 +628,9 @@
           <a:lstStyle/>
           <a:p>
             <a:r>
-              <a:rPr lang="en-US" smtClean="0"/>
+              <a:rPr lang="en-US"/>
               <a:t>Click to edit Master title style</a:t>
             </a:r>
-            <a:endParaRPr lang="en-US"/>
           </a:p>
         </p:txBody>
       </p:sp>
@@ -725,10 +746,9 @@
           </a:lstStyle>
           <a:p>
             <a:r>
-              <a:rPr lang="en-US" smtClean="0"/>
+              <a:rPr lang="en-US"/>
               <a:t>Click to edit Master subtitle style</a:t>
             </a:r>
-            <a:endParaRPr lang="en-US"/>
           </a:p>
         </p:txBody>
       </p:sp>
@@ -750,7 +770,7 @@
             <a:fld id="{1D8BD707-D9CF-40AE-B4C6-C98DA3205C09}" type="datetimeFigureOut">
               <a:rPr lang="en-US" smtClean="0"/>
               <a:pPr/>
-              <a:t>3/11/2014</a:t>
+              <a:t>1/22/2017</a:t>
             </a:fld>
             <a:endParaRPr lang="en-US"/>
           </a:p>
@@ -840,10 +860,9 @@
           <a:lstStyle/>
           <a:p>
             <a:r>
-              <a:rPr lang="en-US" smtClean="0"/>
+              <a:rPr lang="en-US"/>
               <a:t>Click to edit Master title style</a:t>
             </a:r>
-            <a:endParaRPr lang="en-US"/>
           </a:p>
         </p:txBody>
       </p:sp>
@@ -864,38 +883,37 @@
           <a:p>
             <a:pPr lvl="0"/>
             <a:r>
-              <a:rPr lang="en-US" smtClean="0"/>
+              <a:rPr lang="en-US"/>
               <a:t>Click to edit Master text styles</a:t>
             </a:r>
           </a:p>
           <a:p>
             <a:pPr lvl="1"/>
             <a:r>
-              <a:rPr lang="en-US" smtClean="0"/>
+              <a:rPr lang="en-US"/>
               <a:t>Second level</a:t>
             </a:r>
           </a:p>
           <a:p>
             <a:pPr lvl="2"/>
             <a:r>
-              <a:rPr lang="en-US" smtClean="0"/>
+              <a:rPr lang="en-US"/>
               <a:t>Third level</a:t>
             </a:r>
           </a:p>
           <a:p>
             <a:pPr lvl="3"/>
             <a:r>
-              <a:rPr lang="en-US" smtClean="0"/>
+              <a:rPr lang="en-US"/>
               <a:t>Fourth level</a:t>
             </a:r>
           </a:p>
           <a:p>
             <a:pPr lvl="4"/>
             <a:r>
-              <a:rPr lang="en-US" smtClean="0"/>
+              <a:rPr lang="en-US"/>
               <a:t>Fifth level</a:t>
             </a:r>
-            <a:endParaRPr lang="en-US"/>
           </a:p>
         </p:txBody>
       </p:sp>
@@ -917,7 +935,7 @@
             <a:fld id="{1D8BD707-D9CF-40AE-B4C6-C98DA3205C09}" type="datetimeFigureOut">
               <a:rPr lang="en-US" smtClean="0"/>
               <a:pPr/>
-              <a:t>3/11/2014</a:t>
+              <a:t>1/22/2017</a:t>
             </a:fld>
             <a:endParaRPr lang="en-US"/>
           </a:p>
@@ -1012,10 +1030,9 @@
           <a:lstStyle/>
           <a:p>
             <a:r>
-              <a:rPr lang="en-US" smtClean="0"/>
+              <a:rPr lang="en-US"/>
               <a:t>Click to edit Master title style</a:t>
             </a:r>
-            <a:endParaRPr lang="en-US"/>
           </a:p>
         </p:txBody>
       </p:sp>
@@ -1041,38 +1058,37 @@
           <a:p>
             <a:pPr lvl="0"/>
             <a:r>
-              <a:rPr lang="en-US" smtClean="0"/>
+              <a:rPr lang="en-US"/>
               <a:t>Click to edit Master text styles</a:t>
             </a:r>
           </a:p>
           <a:p>
             <a:pPr lvl="1"/>
             <a:r>
-              <a:rPr lang="en-US" smtClean="0"/>
+              <a:rPr lang="en-US"/>
               <a:t>Second level</a:t>
             </a:r>
           </a:p>
           <a:p>
             <a:pPr lvl="2"/>
             <a:r>
-              <a:rPr lang="en-US" smtClean="0"/>
+              <a:rPr lang="en-US"/>
               <a:t>Third level</a:t>
             </a:r>
           </a:p>
           <a:p>
             <a:pPr lvl="3"/>
             <a:r>
-              <a:rPr lang="en-US" smtClean="0"/>
+              <a:rPr lang="en-US"/>
               <a:t>Fourth level</a:t>
             </a:r>
           </a:p>
           <a:p>
             <a:pPr lvl="4"/>
             <a:r>
-              <a:rPr lang="en-US" smtClean="0"/>
+              <a:rPr lang="en-US"/>
               <a:t>Fifth level</a:t>
             </a:r>
-            <a:endParaRPr lang="en-US"/>
           </a:p>
         </p:txBody>
       </p:sp>
@@ -1094,7 +1110,7 @@
             <a:fld id="{1D8BD707-D9CF-40AE-B4C6-C98DA3205C09}" type="datetimeFigureOut">
               <a:rPr lang="en-US" smtClean="0"/>
               <a:pPr/>
-              <a:t>3/11/2014</a:t>
+              <a:t>1/22/2017</a:t>
             </a:fld>
             <a:endParaRPr lang="en-US"/>
           </a:p>
@@ -1184,10 +1200,9 @@
           <a:lstStyle/>
           <a:p>
             <a:r>
-              <a:rPr lang="en-US" smtClean="0"/>
+              <a:rPr lang="en-US"/>
               <a:t>Click to edit Master title style</a:t>
             </a:r>
-            <a:endParaRPr lang="en-US"/>
           </a:p>
         </p:txBody>
       </p:sp>
@@ -1208,38 +1223,37 @@
           <a:p>
             <a:pPr lvl="0"/>
             <a:r>
-              <a:rPr lang="en-US" smtClean="0"/>
+              <a:rPr lang="en-US"/>
               <a:t>Click to edit Master text styles</a:t>
             </a:r>
           </a:p>
           <a:p>
             <a:pPr lvl="1"/>
             <a:r>
-              <a:rPr lang="en-US" smtClean="0"/>
+              <a:rPr lang="en-US"/>
               <a:t>Second level</a:t>
             </a:r>
           </a:p>
           <a:p>
             <a:pPr lvl="2"/>
             <a:r>
-              <a:rPr lang="en-US" smtClean="0"/>
+              <a:rPr lang="en-US"/>
               <a:t>Third level</a:t>
             </a:r>
           </a:p>
           <a:p>
             <a:pPr lvl="3"/>
             <a:r>
-              <a:rPr lang="en-US" smtClean="0"/>
+              <a:rPr lang="en-US"/>
               <a:t>Fourth level</a:t>
             </a:r>
           </a:p>
           <a:p>
             <a:pPr lvl="4"/>
             <a:r>
-              <a:rPr lang="en-US" smtClean="0"/>
+              <a:rPr lang="en-US"/>
               <a:t>Fifth level</a:t>
             </a:r>
-            <a:endParaRPr lang="en-US"/>
           </a:p>
         </p:txBody>
       </p:sp>
@@ -1261,7 +1275,7 @@
             <a:fld id="{1D8BD707-D9CF-40AE-B4C6-C98DA3205C09}" type="datetimeFigureOut">
               <a:rPr lang="en-US" smtClean="0"/>
               <a:pPr/>
-              <a:t>3/11/2014</a:t>
+              <a:t>1/22/2017</a:t>
             </a:fld>
             <a:endParaRPr lang="en-US"/>
           </a:p>
@@ -1360,10 +1374,9 @@
           </a:lstStyle>
           <a:p>
             <a:r>
-              <a:rPr lang="en-US" smtClean="0"/>
+              <a:rPr lang="en-US"/>
               <a:t>Click to edit Master title style</a:t>
             </a:r>
-            <a:endParaRPr lang="en-US"/>
           </a:p>
         </p:txBody>
       </p:sp>
@@ -1480,7 +1493,7 @@
           <a:p>
             <a:pPr lvl="0"/>
             <a:r>
-              <a:rPr lang="en-US" smtClean="0"/>
+              <a:rPr lang="en-US"/>
               <a:t>Click to edit Master text styles</a:t>
             </a:r>
           </a:p>
@@ -1504,7 +1517,7 @@
             <a:fld id="{1D8BD707-D9CF-40AE-B4C6-C98DA3205C09}" type="datetimeFigureOut">
               <a:rPr lang="en-US" smtClean="0"/>
               <a:pPr/>
-              <a:t>3/11/2014</a:t>
+              <a:t>1/22/2017</a:t>
             </a:fld>
             <a:endParaRPr lang="en-US"/>
           </a:p>
@@ -1594,10 +1607,9 @@
           <a:lstStyle/>
           <a:p>
             <a:r>
-              <a:rPr lang="en-US" smtClean="0"/>
+              <a:rPr lang="en-US"/>
               <a:t>Click to edit Master title style</a:t>
             </a:r>
-            <a:endParaRPr lang="en-US"/>
           </a:p>
         </p:txBody>
       </p:sp>
@@ -1651,38 +1663,37 @@
           <a:p>
             <a:pPr lvl="0"/>
             <a:r>
-              <a:rPr lang="en-US" smtClean="0"/>
+              <a:rPr lang="en-US"/>
               <a:t>Click to edit Master text styles</a:t>
             </a:r>
           </a:p>
           <a:p>
             <a:pPr lvl="1"/>
             <a:r>
-              <a:rPr lang="en-US" smtClean="0"/>
+              <a:rPr lang="en-US"/>
               <a:t>Second level</a:t>
             </a:r>
           </a:p>
           <a:p>
             <a:pPr lvl="2"/>
             <a:r>
-              <a:rPr lang="en-US" smtClean="0"/>
+              <a:rPr lang="en-US"/>
               <a:t>Third level</a:t>
             </a:r>
           </a:p>
           <a:p>
             <a:pPr lvl="3"/>
             <a:r>
-              <a:rPr lang="en-US" smtClean="0"/>
+              <a:rPr lang="en-US"/>
               <a:t>Fourth level</a:t>
             </a:r>
           </a:p>
           <a:p>
             <a:pPr lvl="4"/>
             <a:r>
-              <a:rPr lang="en-US" smtClean="0"/>
+              <a:rPr lang="en-US"/>
               <a:t>Fifth level</a:t>
             </a:r>
-            <a:endParaRPr lang="en-US"/>
           </a:p>
         </p:txBody>
       </p:sp>
@@ -1736,38 +1747,37 @@
           <a:p>
             <a:pPr lvl="0"/>
             <a:r>
-              <a:rPr lang="en-US" smtClean="0"/>
+              <a:rPr lang="en-US"/>
               <a:t>Click to edit Master text styles</a:t>
             </a:r>
           </a:p>
           <a:p>
             <a:pPr lvl="1"/>
             <a:r>
-              <a:rPr lang="en-US" smtClean="0"/>
+              <a:rPr lang="en-US"/>
               <a:t>Second level</a:t>
             </a:r>
           </a:p>
           <a:p>
             <a:pPr lvl="2"/>
             <a:r>
-              <a:rPr lang="en-US" smtClean="0"/>
+              <a:rPr lang="en-US"/>
               <a:t>Third level</a:t>
             </a:r>
           </a:p>
           <a:p>
             <a:pPr lvl="3"/>
             <a:r>
-              <a:rPr lang="en-US" smtClean="0"/>
+              <a:rPr lang="en-US"/>
               <a:t>Fourth level</a:t>
             </a:r>
           </a:p>
           <a:p>
             <a:pPr lvl="4"/>
             <a:r>
-              <a:rPr lang="en-US" smtClean="0"/>
+              <a:rPr lang="en-US"/>
               <a:t>Fifth level</a:t>
             </a:r>
-            <a:endParaRPr lang="en-US"/>
           </a:p>
         </p:txBody>
       </p:sp>
@@ -1789,7 +1799,7 @@
             <a:fld id="{1D8BD707-D9CF-40AE-B4C6-C98DA3205C09}" type="datetimeFigureOut">
               <a:rPr lang="en-US" smtClean="0"/>
               <a:pPr/>
-              <a:t>3/11/2014</a:t>
+              <a:t>1/22/2017</a:t>
             </a:fld>
             <a:endParaRPr lang="en-US"/>
           </a:p>
@@ -1883,10 +1893,9 @@
           </a:lstStyle>
           <a:p>
             <a:r>
-              <a:rPr lang="en-US" smtClean="0"/>
+              <a:rPr lang="en-US"/>
               <a:t>Click to edit Master title style</a:t>
             </a:r>
-            <a:endParaRPr lang="en-US"/>
           </a:p>
         </p:txBody>
       </p:sp>
@@ -1949,7 +1958,7 @@
           <a:p>
             <a:pPr lvl="0"/>
             <a:r>
-              <a:rPr lang="en-US" smtClean="0"/>
+              <a:rPr lang="en-US"/>
               <a:t>Click to edit Master text styles</a:t>
             </a:r>
           </a:p>
@@ -2005,38 +2014,37 @@
           <a:p>
             <a:pPr lvl="0"/>
             <a:r>
-              <a:rPr lang="en-US" smtClean="0"/>
+              <a:rPr lang="en-US"/>
               <a:t>Click to edit Master text styles</a:t>
             </a:r>
           </a:p>
           <a:p>
             <a:pPr lvl="1"/>
             <a:r>
-              <a:rPr lang="en-US" smtClean="0"/>
+              <a:rPr lang="en-US"/>
               <a:t>Second level</a:t>
             </a:r>
           </a:p>
           <a:p>
             <a:pPr lvl="2"/>
             <a:r>
-              <a:rPr lang="en-US" smtClean="0"/>
+              <a:rPr lang="en-US"/>
               <a:t>Third level</a:t>
             </a:r>
           </a:p>
           <a:p>
             <a:pPr lvl="3"/>
             <a:r>
-              <a:rPr lang="en-US" smtClean="0"/>
+              <a:rPr lang="en-US"/>
               <a:t>Fourth level</a:t>
             </a:r>
           </a:p>
           <a:p>
             <a:pPr lvl="4"/>
             <a:r>
-              <a:rPr lang="en-US" smtClean="0"/>
+              <a:rPr lang="en-US"/>
               <a:t>Fifth level</a:t>
             </a:r>
-            <a:endParaRPr lang="en-US"/>
           </a:p>
         </p:txBody>
       </p:sp>
@@ -2099,7 +2107,7 @@
           <a:p>
             <a:pPr lvl="0"/>
             <a:r>
-              <a:rPr lang="en-US" smtClean="0"/>
+              <a:rPr lang="en-US"/>
               <a:t>Click to edit Master text styles</a:t>
             </a:r>
           </a:p>
@@ -2155,38 +2163,37 @@
           <a:p>
             <a:pPr lvl="0"/>
             <a:r>
-              <a:rPr lang="en-US" smtClean="0"/>
+              <a:rPr lang="en-US"/>
               <a:t>Click to edit Master text styles</a:t>
             </a:r>
           </a:p>
           <a:p>
             <a:pPr lvl="1"/>
             <a:r>
-              <a:rPr lang="en-US" smtClean="0"/>
+              <a:rPr lang="en-US"/>
               <a:t>Second level</a:t>
             </a:r>
           </a:p>
           <a:p>
             <a:pPr lvl="2"/>
             <a:r>
-              <a:rPr lang="en-US" smtClean="0"/>
+              <a:rPr lang="en-US"/>
               <a:t>Third level</a:t>
             </a:r>
           </a:p>
           <a:p>
             <a:pPr lvl="3"/>
             <a:r>
-              <a:rPr lang="en-US" smtClean="0"/>
+              <a:rPr lang="en-US"/>
               <a:t>Fourth level</a:t>
             </a:r>
           </a:p>
           <a:p>
             <a:pPr lvl="4"/>
             <a:r>
-              <a:rPr lang="en-US" smtClean="0"/>
+              <a:rPr lang="en-US"/>
               <a:t>Fifth level</a:t>
             </a:r>
-            <a:endParaRPr lang="en-US"/>
           </a:p>
         </p:txBody>
       </p:sp>
@@ -2208,7 +2215,7 @@
             <a:fld id="{1D8BD707-D9CF-40AE-B4C6-C98DA3205C09}" type="datetimeFigureOut">
               <a:rPr lang="en-US" smtClean="0"/>
               <a:pPr/>
-              <a:t>3/11/2014</a:t>
+              <a:t>1/22/2017</a:t>
             </a:fld>
             <a:endParaRPr lang="en-US"/>
           </a:p>
@@ -2298,10 +2305,9 @@
           <a:lstStyle/>
           <a:p>
             <a:r>
-              <a:rPr lang="en-US" smtClean="0"/>
+              <a:rPr lang="en-US"/>
               <a:t>Click to edit Master title style</a:t>
             </a:r>
-            <a:endParaRPr lang="en-US"/>
           </a:p>
         </p:txBody>
       </p:sp>
@@ -2323,7 +2329,7 @@
             <a:fld id="{1D8BD707-D9CF-40AE-B4C6-C98DA3205C09}" type="datetimeFigureOut">
               <a:rPr lang="en-US" smtClean="0"/>
               <a:pPr/>
-              <a:t>3/11/2014</a:t>
+              <a:t>1/22/2017</a:t>
             </a:fld>
             <a:endParaRPr lang="en-US"/>
           </a:p>
@@ -2415,7 +2421,7 @@
             <a:fld id="{1D8BD707-D9CF-40AE-B4C6-C98DA3205C09}" type="datetimeFigureOut">
               <a:rPr lang="en-US" smtClean="0"/>
               <a:pPr/>
-              <a:t>3/11/2014</a:t>
+              <a:t>1/22/2017</a:t>
             </a:fld>
             <a:endParaRPr lang="en-US"/>
           </a:p>
@@ -2514,10 +2520,9 @@
           </a:lstStyle>
           <a:p>
             <a:r>
-              <a:rPr lang="en-US" smtClean="0"/>
+              <a:rPr lang="en-US"/>
               <a:t>Click to edit Master title style</a:t>
             </a:r>
-            <a:endParaRPr lang="en-US"/>
           </a:p>
         </p:txBody>
       </p:sp>
@@ -2571,38 +2576,37 @@
           <a:p>
             <a:pPr lvl="0"/>
             <a:r>
-              <a:rPr lang="en-US" smtClean="0"/>
+              <a:rPr lang="en-US"/>
               <a:t>Click to edit Master text styles</a:t>
             </a:r>
           </a:p>
           <a:p>
             <a:pPr lvl="1"/>
             <a:r>
-              <a:rPr lang="en-US" smtClean="0"/>
+              <a:rPr lang="en-US"/>
               <a:t>Second level</a:t>
             </a:r>
           </a:p>
           <a:p>
             <a:pPr lvl="2"/>
             <a:r>
-              <a:rPr lang="en-US" smtClean="0"/>
+              <a:rPr lang="en-US"/>
               <a:t>Third level</a:t>
             </a:r>
           </a:p>
           <a:p>
             <a:pPr lvl="3"/>
             <a:r>
-              <a:rPr lang="en-US" smtClean="0"/>
+              <a:rPr lang="en-US"/>
               <a:t>Fourth level</a:t>
             </a:r>
           </a:p>
           <a:p>
             <a:pPr lvl="4"/>
             <a:r>
-              <a:rPr lang="en-US" smtClean="0"/>
+              <a:rPr lang="en-US"/>
               <a:t>Fifth level</a:t>
             </a:r>
-            <a:endParaRPr lang="en-US"/>
           </a:p>
         </p:txBody>
       </p:sp>
@@ -2665,7 +2669,7 @@
           <a:p>
             <a:pPr lvl="0"/>
             <a:r>
-              <a:rPr lang="en-US" smtClean="0"/>
+              <a:rPr lang="en-US"/>
               <a:t>Click to edit Master text styles</a:t>
             </a:r>
           </a:p>
@@ -2689,7 +2693,7 @@
             <a:fld id="{1D8BD707-D9CF-40AE-B4C6-C98DA3205C09}" type="datetimeFigureOut">
               <a:rPr lang="en-US" smtClean="0"/>
               <a:pPr/>
-              <a:t>3/11/2014</a:t>
+              <a:t>1/22/2017</a:t>
             </a:fld>
             <a:endParaRPr lang="en-US"/>
           </a:p>
@@ -2788,10 +2792,9 @@
           </a:lstStyle>
           <a:p>
             <a:r>
-              <a:rPr lang="en-US" smtClean="0"/>
+              <a:rPr lang="en-US"/>
               <a:t>Click to edit Master title style</a:t>
             </a:r>
-            <a:endParaRPr lang="en-US"/>
           </a:p>
         </p:txBody>
       </p:sp>
@@ -2915,7 +2918,7 @@
           <a:p>
             <a:pPr lvl="0"/>
             <a:r>
-              <a:rPr lang="en-US" smtClean="0"/>
+              <a:rPr lang="en-US"/>
               <a:t>Click to edit Master text styles</a:t>
             </a:r>
           </a:p>
@@ -2939,7 +2942,7 @@
             <a:fld id="{1D8BD707-D9CF-40AE-B4C6-C98DA3205C09}" type="datetimeFigureOut">
               <a:rPr lang="en-US" smtClean="0"/>
               <a:pPr/>
-              <a:t>3/11/2014</a:t>
+              <a:t>1/22/2017</a:t>
             </a:fld>
             <a:endParaRPr lang="en-US"/>
           </a:p>
@@ -3044,10 +3047,9 @@
           <a:lstStyle/>
           <a:p>
             <a:r>
-              <a:rPr lang="en-US" smtClean="0"/>
+              <a:rPr lang="en-US"/>
               <a:t>Click to edit Master title style</a:t>
             </a:r>
-            <a:endParaRPr lang="en-US"/>
           </a:p>
         </p:txBody>
       </p:sp>
@@ -3078,38 +3080,37 @@
           <a:p>
             <a:pPr lvl="0"/>
             <a:r>
-              <a:rPr lang="en-US" smtClean="0"/>
+              <a:rPr lang="en-US"/>
               <a:t>Click to edit Master text styles</a:t>
             </a:r>
           </a:p>
           <a:p>
             <a:pPr lvl="1"/>
             <a:r>
-              <a:rPr lang="en-US" smtClean="0"/>
+              <a:rPr lang="en-US"/>
               <a:t>Second level</a:t>
             </a:r>
           </a:p>
           <a:p>
             <a:pPr lvl="2"/>
             <a:r>
-              <a:rPr lang="en-US" smtClean="0"/>
+              <a:rPr lang="en-US"/>
               <a:t>Third level</a:t>
             </a:r>
           </a:p>
           <a:p>
             <a:pPr lvl="3"/>
             <a:r>
-              <a:rPr lang="en-US" smtClean="0"/>
+              <a:rPr lang="en-US"/>
               <a:t>Fourth level</a:t>
             </a:r>
           </a:p>
           <a:p>
             <a:pPr lvl="4"/>
             <a:r>
-              <a:rPr lang="en-US" smtClean="0"/>
+              <a:rPr lang="en-US"/>
               <a:t>Fifth level</a:t>
             </a:r>
-            <a:endParaRPr lang="en-US"/>
           </a:p>
         </p:txBody>
       </p:sp>
@@ -3149,7 +3150,7 @@
             <a:fld id="{1D8BD707-D9CF-40AE-B4C6-C98DA3205C09}" type="datetimeFigureOut">
               <a:rPr lang="en-US" smtClean="0"/>
               <a:pPr/>
-              <a:t>3/11/2014</a:t>
+              <a:t>1/22/2017</a:t>
             </a:fld>
             <a:endParaRPr lang="en-US"/>
           </a:p>
@@ -3715,7 +3716,7 @@
             <a:lstStyle/>
             <a:p>
               <a:r>
-                <a:rPr lang="en-US" sz="3200" spc="-200" dirty="0" smtClean="0">
+                <a:rPr lang="en-US" sz="3200" spc="-200" dirty="0">
                   <a:solidFill>
                     <a:srgbClr val="FF6600"/>
                   </a:solidFill>
@@ -3749,7 +3750,7 @@
             <a:p>
               <a:pPr lvl="0"/>
               <a:r>
-                <a:rPr lang="en-US" sz="4800" b="1" spc="200" dirty="0" smtClean="0">
+                <a:rPr lang="en-US" sz="4800" b="1" spc="200" dirty="0">
                   <a:solidFill>
                     <a:srgbClr val="0070C0"/>
                   </a:solidFill>
@@ -3757,12 +3758,6 @@
                 </a:rPr>
                 <a:t>Labs</a:t>
               </a:r>
-              <a:endParaRPr lang="en-US" sz="4800" b="1" spc="200" dirty="0">
-                <a:solidFill>
-                  <a:srgbClr val="0070C0"/>
-                </a:solidFill>
-                <a:latin typeface="Gill Sans Ultra Bold" pitchFamily="34" charset="0"/>
-              </a:endParaRPr>
             </a:p>
           </p:txBody>
         </p:sp>
@@ -3809,14 +3804,11 @@
             <a:p>
               <a:pPr marL="57150" indent="57150"/>
               <a:r>
-                <a:rPr lang="en-US" b="1" dirty="0" smtClean="0">
+                <a:rPr lang="en-US" b="1" dirty="0">
                   <a:latin typeface="Franklin Gothic Book" pitchFamily="34" charset="0"/>
                 </a:rPr>
                 <a:t>slide added by</a:t>
               </a:r>
-              <a:endParaRPr lang="en-US" b="1" dirty="0">
-                <a:latin typeface="Franklin Gothic Book" pitchFamily="34" charset="0"/>
-              </a:endParaRPr>
             </a:p>
           </p:txBody>
         </p:sp>
@@ -3844,10 +3836,9 @@
           <a:lstStyle/>
           <a:p>
             <a:r>
-              <a:rPr lang="en-US" dirty="0" smtClean="0"/>
+              <a:rPr lang="en-US" dirty="0"/>
               <a:t>Slightly transparent version, to be used in the plugin</a:t>
             </a:r>
-            <a:endParaRPr lang="en-US" dirty="0"/>
           </a:p>
         </p:txBody>
       </p:sp>
@@ -3875,10 +3866,9 @@
           <a:p>
             <a:pPr algn="r"/>
             <a:r>
-              <a:rPr lang="en-US" dirty="0" smtClean="0"/>
+              <a:rPr lang="en-US" dirty="0"/>
               <a:t>Source object</a:t>
             </a:r>
-            <a:endParaRPr lang="en-US" dirty="0"/>
           </a:p>
         </p:txBody>
       </p:sp>
@@ -3956,13 +3946,6 @@
   <p:clrMapOvr>
     <a:masterClrMapping/>
   </p:clrMapOvr>
-  <p:timing>
-    <p:tnLst>
-      <p:par>
-        <p:cTn id="1" dur="indefinite" restart="never" nodeType="tmRoot"/>
-      </p:par>
-    </p:tnLst>
-  </p:timing>
 </p:sld>
 </file>
 
@@ -3983,177 +3966,299 @@
           <a:chExt cx="0" cy="0"/>
         </a:xfrm>
       </p:grpSpPr>
-      <p:sp>
-        <p:nvSpPr>
-          <p:cNvPr id="4" name="Rounded Rectangle 3"/>
-          <p:cNvSpPr/>
+      <p:grpSp>
+        <p:nvGrpSpPr>
+          <p:cNvPr id="9" name="Group 34"/>
+          <p:cNvGrpSpPr/>
           <p:nvPr/>
-        </p:nvSpPr>
-        <p:spPr>
+        </p:nvGrpSpPr>
+        <p:grpSpPr>
           <a:xfrm>
-            <a:off x="762000" y="1011382"/>
-            <a:ext cx="7848600" cy="4876800"/>
+            <a:off x="419100" y="1257301"/>
+            <a:ext cx="8305800" cy="4343399"/>
+            <a:chOff x="381000" y="1600200"/>
+            <a:chExt cx="8305800" cy="4343399"/>
           </a:xfrm>
-          <a:prstGeom prst="roundRect">
-            <a:avLst>
-              <a:gd name="adj" fmla="val 5303"/>
-            </a:avLst>
-          </a:prstGeom>
-          <a:solidFill>
-            <a:srgbClr val="0070C0"/>
-          </a:solidFill>
-        </p:spPr>
-        <p:style>
-          <a:lnRef idx="2">
-            <a:schemeClr val="accent1">
-              <a:shade val="50000"/>
-            </a:schemeClr>
-          </a:lnRef>
-          <a:fillRef idx="1">
-            <a:schemeClr val="accent1"/>
-          </a:fillRef>
-          <a:effectRef idx="0">
-            <a:schemeClr val="accent1"/>
-          </a:effectRef>
-          <a:fontRef idx="minor">
-            <a:schemeClr val="lt1"/>
-          </a:fontRef>
-        </p:style>
-        <p:txBody>
-          <a:bodyPr rtlCol="0" anchor="ctr"/>
-          <a:lstStyle/>
-          <a:p>
-            <a:pPr algn="ctr"/>
-            <a:r>
-              <a:rPr lang="en-US" sz="3200" b="1" dirty="0" smtClean="0"/>
-              <a:t>ACKNOWLEDGEMENT</a:t>
-            </a:r>
-            <a:endParaRPr lang="en-US" sz="3200" b="1" dirty="0" smtClean="0"/>
-          </a:p>
-          <a:p>
-            <a:pPr algn="ctr"/>
-            <a:endParaRPr lang="en-US" dirty="0" smtClean="0"/>
-          </a:p>
-          <a:p>
-            <a:pPr algn="ctr"/>
-            <a:endParaRPr lang="en-US" dirty="0"/>
-          </a:p>
-          <a:p>
-            <a:pPr algn="ctr"/>
-            <a:r>
-              <a:rPr lang="en-US" sz="2400" dirty="0" smtClean="0"/>
-              <a:t>This presentation benefitted from </a:t>
-            </a:r>
-            <a:br>
-              <a:rPr lang="en-US" sz="2400" dirty="0" smtClean="0"/>
-            </a:br>
-            <a:r>
-              <a:rPr lang="en-US" sz="5400" b="1" dirty="0" err="1" smtClean="0"/>
-              <a:t>PowerPointLabs</a:t>
-            </a:r>
-            <a:r>
-              <a:rPr lang="en-US" sz="2400" dirty="0" smtClean="0"/>
-              <a:t> </a:t>
-            </a:r>
-            <a:br>
-              <a:rPr lang="en-US" sz="2400" dirty="0" smtClean="0"/>
-            </a:br>
-            <a:r>
-              <a:rPr lang="en-US" sz="2400" dirty="0" smtClean="0"/>
-              <a:t>a </a:t>
-            </a:r>
-            <a:r>
-              <a:rPr lang="en-US" sz="2400" dirty="0" smtClean="0"/>
-              <a:t>PowerPoint </a:t>
-            </a:r>
-            <a:r>
-              <a:rPr lang="en-US" sz="2400" dirty="0" smtClean="0"/>
-              <a:t>plugin for </a:t>
-            </a:r>
-            <a:r>
-              <a:rPr lang="en-US" sz="2400" dirty="0" smtClean="0">
+        </p:grpSpPr>
+        <p:sp>
+          <p:nvSpPr>
+            <p:cNvPr id="10" name="Rectangle 9"/>
+            <p:cNvSpPr/>
+            <p:nvPr/>
+          </p:nvSpPr>
+          <p:spPr>
+            <a:xfrm>
+              <a:off x="381000" y="1600200"/>
+              <a:ext cx="8305800" cy="685800"/>
+            </a:xfrm>
+            <a:prstGeom prst="rect">
+              <a:avLst/>
+            </a:prstGeom>
+            <a:solidFill>
+              <a:schemeClr val="tx1"/>
+            </a:solidFill>
+            <a:ln>
+              <a:solidFill>
+                <a:schemeClr val="tx1"/>
+              </a:solidFill>
+            </a:ln>
+          </p:spPr>
+          <p:style>
+            <a:lnRef idx="2">
+              <a:schemeClr val="accent1">
+                <a:shade val="50000"/>
+              </a:schemeClr>
+            </a:lnRef>
+            <a:fillRef idx="1">
+              <a:schemeClr val="accent1"/>
+            </a:fillRef>
+            <a:effectRef idx="0">
+              <a:schemeClr val="accent1"/>
+            </a:effectRef>
+            <a:fontRef idx="minor">
+              <a:schemeClr val="lt1"/>
+            </a:fontRef>
+          </p:style>
+          <p:txBody>
+            <a:bodyPr rtlCol="0" anchor="ctr"/>
+            <a:lstStyle/>
+            <a:p>
+              <a:pPr algn="ctr"/>
+              <a:r>
+                <a:rPr lang="en-US" sz="3200" b="1" dirty="0">
+                  <a:latin typeface="Franklin Gothic Demi" panose="020B0703020102020204" pitchFamily="34" charset="0"/>
+                </a:rPr>
+                <a:t>ACKNOWLEDGEMENT</a:t>
+              </a:r>
+            </a:p>
+          </p:txBody>
+        </p:sp>
+        <p:sp>
+          <p:nvSpPr>
+            <p:cNvPr id="11" name="Rectangle 10"/>
+            <p:cNvSpPr/>
+            <p:nvPr/>
+          </p:nvSpPr>
+          <p:spPr>
+            <a:xfrm>
+              <a:off x="381000" y="2289698"/>
+              <a:ext cx="8305800" cy="3653901"/>
+            </a:xfrm>
+            <a:prstGeom prst="rect">
+              <a:avLst/>
+            </a:prstGeom>
+            <a:solidFill>
+              <a:schemeClr val="bg1"/>
+            </a:solidFill>
+            <a:ln>
+              <a:solidFill>
+                <a:schemeClr val="tx1"/>
+              </a:solidFill>
+            </a:ln>
+          </p:spPr>
+          <p:style>
+            <a:lnRef idx="2">
+              <a:schemeClr val="accent1">
+                <a:shade val="50000"/>
+              </a:schemeClr>
+            </a:lnRef>
+            <a:fillRef idx="1">
+              <a:schemeClr val="accent1"/>
+            </a:fillRef>
+            <a:effectRef idx="0">
+              <a:schemeClr val="accent1"/>
+            </a:effectRef>
+            <a:fontRef idx="minor">
+              <a:schemeClr val="lt1"/>
+            </a:fontRef>
+          </p:style>
+          <p:txBody>
+            <a:bodyPr rtlCol="0" anchor="ctr"/>
+            <a:lstStyle/>
+            <a:p>
+              <a:pPr algn="ctr"/>
+              <a:r>
+                <a:rPr lang="en-US" sz="2400" b="1" dirty="0">
+                  <a:solidFill>
+                    <a:schemeClr val="tx1"/>
+                  </a:solidFill>
+                  <a:latin typeface="Segoe UI" panose="020B0502040204020203" pitchFamily="34" charset="0"/>
+                  <a:cs typeface="Segoe UI" panose="020B0502040204020203" pitchFamily="34" charset="0"/>
+                </a:rPr>
+                <a:t>This presentation benefitted from</a:t>
+              </a:r>
+            </a:p>
+            <a:p>
+              <a:pPr algn="ctr"/>
+              <a:r>
+                <a:rPr lang="en-US" sz="2400" b="1" dirty="0" err="1">
+                  <a:solidFill>
+                    <a:schemeClr val="tx1"/>
+                  </a:solidFill>
+                  <a:latin typeface="Segoe UI" panose="020B0502040204020203" pitchFamily="34" charset="0"/>
+                  <a:cs typeface="Segoe UI" panose="020B0502040204020203" pitchFamily="34" charset="0"/>
+                </a:rPr>
+                <a:t>PowerPointLabs</a:t>
+              </a:r>
+              <a:endParaRPr lang="en-US" sz="2400" b="1" dirty="0">
                 <a:solidFill>
-                  <a:schemeClr val="bg1"/>
+                  <a:schemeClr val="tx1"/>
                 </a:solidFill>
-              </a:rPr>
-              <a:t>creating</a:t>
-            </a:r>
-            <a:r>
-              <a:rPr lang="en-US" sz="2400" dirty="0" smtClean="0"/>
-              <a:t> </a:t>
-            </a:r>
-            <a:br>
-              <a:rPr lang="en-US" sz="2400" dirty="0" smtClean="0"/>
-            </a:br>
-            <a:r>
-              <a:rPr lang="en-US" sz="2800" dirty="0" smtClean="0">
-                <a:solidFill>
-                  <a:srgbClr val="FFFF00"/>
-                </a:solidFill>
-              </a:rPr>
-              <a:t>better presentations with less effort</a:t>
-            </a:r>
-            <a:r>
-              <a:rPr lang="en-US" sz="2400" dirty="0" smtClean="0"/>
-              <a:t>. </a:t>
-            </a:r>
-          </a:p>
-          <a:p>
-            <a:pPr algn="ctr"/>
-            <a:endParaRPr lang="en-US" sz="2400" dirty="0"/>
-          </a:p>
-          <a:p>
-            <a:pPr algn="ctr"/>
-            <a:r>
-              <a:rPr lang="en-US" sz="2800" dirty="0" err="1" smtClean="0"/>
-              <a:t>PowerPointLabs</a:t>
-            </a:r>
-            <a:r>
-              <a:rPr lang="en-US" sz="2400" dirty="0" smtClean="0"/>
-              <a:t> </a:t>
-            </a:r>
-            <a:br>
-              <a:rPr lang="en-US" sz="2400" dirty="0" smtClean="0"/>
-            </a:br>
-            <a:r>
-              <a:rPr lang="en-US" sz="2800" dirty="0" smtClean="0"/>
-              <a:t>is </a:t>
-            </a:r>
-            <a:r>
-              <a:rPr lang="en-US" sz="2800" dirty="0" smtClean="0">
-                <a:solidFill>
-                  <a:srgbClr val="FFFF00"/>
-                </a:solidFill>
-              </a:rPr>
-              <a:t>available for free </a:t>
-            </a:r>
-            <a:r>
-              <a:rPr lang="en-US" sz="2800" dirty="0" smtClean="0"/>
-              <a:t>at</a:t>
-            </a:r>
-            <a:br>
-              <a:rPr lang="en-US" sz="2800" dirty="0" smtClean="0"/>
-            </a:br>
-            <a:r>
-              <a:rPr lang="en-US" sz="2400" dirty="0" smtClean="0"/>
-              <a:t> </a:t>
-            </a:r>
-            <a:r>
-              <a:rPr lang="en-US" sz="3200" b="1" dirty="0" smtClean="0">
-                <a:solidFill>
-                  <a:srgbClr val="FFFF00"/>
-                </a:solidFill>
-              </a:rPr>
-              <a:t>http://PowerPointLabs.info </a:t>
-            </a:r>
-            <a:endParaRPr lang="en-US" sz="3200" b="1" dirty="0">
+                <a:latin typeface="Segoe UI" panose="020B0502040204020203" pitchFamily="34" charset="0"/>
+                <a:cs typeface="Segoe UI" panose="020B0502040204020203" pitchFamily="34" charset="0"/>
+              </a:endParaRPr>
+            </a:p>
+            <a:p>
+              <a:pPr algn="ctr"/>
+              <a:r>
+                <a:rPr lang="en-US" sz="2400" b="1" dirty="0">
+                  <a:solidFill>
+                    <a:schemeClr val="tx1"/>
+                  </a:solidFill>
+                  <a:latin typeface="Segoe UI" panose="020B0502040204020203" pitchFamily="34" charset="0"/>
+                  <a:cs typeface="Segoe UI" panose="020B0502040204020203" pitchFamily="34" charset="0"/>
+                </a:rPr>
+                <a:t>a PowerPoint plugin for creating</a:t>
+              </a:r>
+            </a:p>
+            <a:p>
+              <a:pPr algn="ctr"/>
+              <a:r>
+                <a:rPr lang="en-US" sz="2400" b="1" dirty="0">
+                  <a:solidFill>
+                    <a:srgbClr val="FF6600"/>
+                  </a:solidFill>
+                  <a:latin typeface="Segoe UI" panose="020B0502040204020203" pitchFamily="34" charset="0"/>
+                  <a:cs typeface="Segoe UI" panose="020B0502040204020203" pitchFamily="34" charset="0"/>
+                </a:rPr>
+                <a:t>better presentations</a:t>
+              </a:r>
+              <a:r>
+                <a:rPr lang="en-US" sz="2400" b="1" dirty="0">
+                  <a:solidFill>
+                    <a:schemeClr val="tx1"/>
+                  </a:solidFill>
+                  <a:latin typeface="Segoe UI" panose="020B0502040204020203" pitchFamily="34" charset="0"/>
+                  <a:cs typeface="Segoe UI" panose="020B0502040204020203" pitchFamily="34" charset="0"/>
+                </a:rPr>
+                <a:t> with </a:t>
+              </a:r>
+              <a:r>
+                <a:rPr lang="en-US" sz="2400" b="1" dirty="0">
+                  <a:solidFill>
+                    <a:srgbClr val="FF6600"/>
+                  </a:solidFill>
+                  <a:latin typeface="Segoe UI" panose="020B0502040204020203" pitchFamily="34" charset="0"/>
+                  <a:cs typeface="Segoe UI" panose="020B0502040204020203" pitchFamily="34" charset="0"/>
+                </a:rPr>
+                <a:t>less effort</a:t>
+              </a:r>
+              <a:r>
+                <a:rPr lang="en-US" sz="2400" b="1" dirty="0">
+                  <a:solidFill>
+                    <a:schemeClr val="tx1"/>
+                  </a:solidFill>
+                  <a:latin typeface="Segoe UI" panose="020B0502040204020203" pitchFamily="34" charset="0"/>
+                  <a:cs typeface="Segoe UI" panose="020B0502040204020203" pitchFamily="34" charset="0"/>
+                </a:rPr>
+                <a:t>.</a:t>
+              </a:r>
+            </a:p>
+          </p:txBody>
+        </p:sp>
+        <p:pic>
+          <p:nvPicPr>
+            <p:cNvPr id="12" name="Picture 11"/>
+            <p:cNvPicPr>
+              <a:picLocks noChangeAspect="1"/>
+            </p:cNvPicPr>
+            <p:nvPr/>
+          </p:nvPicPr>
+          <p:blipFill>
+            <a:blip r:embed="rId2" cstate="print">
+              <a:extLst>
+                <a:ext uri="{28A0092B-C50C-407E-A947-70E740481C1C}">
+                  <a14:useLocalDpi xmlns:a14="http://schemas.microsoft.com/office/drawing/2010/main" val="0"/>
+                </a:ext>
+              </a:extLst>
+            </a:blip>
+            <a:stretch>
+              <a:fillRect/>
+            </a:stretch>
+          </p:blipFill>
+          <p:spPr>
+            <a:xfrm>
+              <a:off x="3252692" y="2528512"/>
+              <a:ext cx="2562416" cy="671888"/>
+            </a:xfrm>
+            <a:prstGeom prst="rect">
+              <a:avLst/>
+            </a:prstGeom>
+          </p:spPr>
+        </p:pic>
+        <p:sp>
+          <p:nvSpPr>
+            <p:cNvPr id="13" name="Rectangle 12"/>
+            <p:cNvSpPr/>
+            <p:nvPr/>
+          </p:nvSpPr>
+          <p:spPr>
+            <a:xfrm>
+              <a:off x="381000" y="5257799"/>
+              <a:ext cx="8305800" cy="685800"/>
+            </a:xfrm>
+            <a:prstGeom prst="rect">
+              <a:avLst/>
+            </a:prstGeom>
+            <a:solidFill>
+              <a:schemeClr val="tx1"/>
+            </a:solidFill>
+            <a:ln>
               <a:solidFill>
-                <a:srgbClr val="FFFF00"/>
+                <a:schemeClr val="tx1"/>
               </a:solidFill>
-            </a:endParaRPr>
-          </a:p>
-        </p:txBody>
-      </p:sp>
+            </a:ln>
+          </p:spPr>
+          <p:style>
+            <a:lnRef idx="2">
+              <a:schemeClr val="accent1">
+                <a:shade val="50000"/>
+              </a:schemeClr>
+            </a:lnRef>
+            <a:fillRef idx="1">
+              <a:schemeClr val="accent1"/>
+            </a:fillRef>
+            <a:effectRef idx="0">
+              <a:schemeClr val="accent1"/>
+            </a:effectRef>
+            <a:fontRef idx="minor">
+              <a:schemeClr val="lt1"/>
+            </a:fontRef>
+          </p:style>
+          <p:txBody>
+            <a:bodyPr rtlCol="0" anchor="ctr"/>
+            <a:lstStyle/>
+            <a:p>
+              <a:pPr algn="ctr"/>
+              <a:r>
+                <a:rPr lang="en-US" sz="2800" b="1" dirty="0">
+                  <a:latin typeface="Franklin Gothic Demi" panose="020B0703020102020204" pitchFamily="34" charset="0"/>
+                </a:rPr>
+                <a:t>Available for free at </a:t>
+              </a:r>
+              <a:r>
+                <a:rPr lang="en-US" sz="2800" b="1" dirty="0">
+                  <a:solidFill>
+                    <a:srgbClr val="FF6600"/>
+                  </a:solidFill>
+                  <a:latin typeface="Franklin Gothic Demi" panose="020B0703020102020204" pitchFamily="34" charset="0"/>
+                </a:rPr>
+                <a:t>http://PowerPointLabs.info</a:t>
+              </a:r>
+            </a:p>
+          </p:txBody>
+        </p:sp>
+      </p:grpSp>
     </p:spTree>
     <p:extLst>
       <p:ext uri="{BB962C8B-B14F-4D97-AF65-F5344CB8AC3E}">

</xml_diff>

<commit_message>
Update Acknowledgement slide to new design (#1085)
* Update Acknowledgement slide to new design

* update test case results with new ack slide
</commit_message>
<xml_diff>
--- a/doc/Indicator.pptx
+++ b/doc/Indicator.pptx
@@ -15,25 +15,32 @@
   <p:notesSz cx="6858000" cy="9144000"/>
   <p:embeddedFontLst>
     <p:embeddedFont>
-      <p:font typeface="Franklin Gothic Demi" charset="0"/>
+      <p:font typeface="Segoe UI" panose="020B0502040204020203" pitchFamily="34" charset="0"/>
       <p:regular r:id="rId5"/>
-      <p:italic r:id="rId6"/>
+      <p:bold r:id="rId6"/>
+      <p:italic r:id="rId7"/>
+      <p:boldItalic r:id="rId8"/>
     </p:embeddedFont>
     <p:embeddedFont>
-      <p:font typeface="Gill Sans Ultra Bold" charset="0"/>
-      <p:regular r:id="rId7"/>
+      <p:font typeface="Franklin Gothic Demi" panose="020B0703020102020204" pitchFamily="34" charset="0"/>
+      <p:regular r:id="rId9"/>
+      <p:italic r:id="rId10"/>
     </p:embeddedFont>
     <p:embeddedFont>
-      <p:font typeface="Calibri" pitchFamily="34" charset="0"/>
-      <p:regular r:id="rId8"/>
-      <p:bold r:id="rId9"/>
-      <p:italic r:id="rId10"/>
-      <p:boldItalic r:id="rId11"/>
+      <p:font typeface="Calibri" panose="020F0502020204030204" pitchFamily="34" charset="0"/>
+      <p:regular r:id="rId11"/>
+      <p:bold r:id="rId12"/>
+      <p:italic r:id="rId13"/>
+      <p:boldItalic r:id="rId14"/>
     </p:embeddedFont>
     <p:embeddedFont>
-      <p:font typeface="Franklin Gothic Book" charset="0"/>
-      <p:regular r:id="rId12"/>
-      <p:italic r:id="rId13"/>
+      <p:font typeface="Franklin Gothic Book" panose="020B0503020102020204" pitchFamily="34" charset="0"/>
+      <p:regular r:id="rId15"/>
+      <p:italic r:id="rId16"/>
+    </p:embeddedFont>
+    <p:embeddedFont>
+      <p:font typeface="Gill Sans Ultra Bold" panose="020B0A02020104020203" pitchFamily="34" charset="0"/>
+      <p:regular r:id="rId17"/>
     </p:embeddedFont>
   </p:embeddedFontLst>
   <p:defaultTextStyle>
@@ -131,6 +138,22 @@
       </a:defRPr>
     </a:lvl9pPr>
   </p:defaultTextStyle>
+  <p:extLst>
+    <p:ext uri="{EFAFB233-063F-42B5-8137-9DF3F51BA10A}">
+      <p15:sldGuideLst xmlns:p15="http://schemas.microsoft.com/office/powerpoint/2012/main">
+        <p15:guide id="1" orient="horz" pos="2160">
+          <p15:clr>
+            <a:srgbClr val="A4A3A4"/>
+          </p15:clr>
+        </p15:guide>
+        <p15:guide id="2" pos="2880">
+          <p15:clr>
+            <a:srgbClr val="A4A3A4"/>
+          </p15:clr>
+        </p15:guide>
+      </p15:sldGuideLst>
+    </p:ext>
+  </p:extLst>
 </p:presentation>
 </file>
 
@@ -216,7 +239,7 @@
           <a:p>
             <a:fld id="{6699ACB9-486C-4D62-A3A7-AF98E13EFDA3}" type="datetimeFigureOut">
               <a:rPr lang="en-US" smtClean="0"/>
-              <a:t>3/11/2014</a:t>
+              <a:t>1/22/2017</a:t>
             </a:fld>
             <a:endParaRPr lang="en-US"/>
           </a:p>
@@ -280,38 +303,37 @@
           <a:p>
             <a:pPr lvl="0"/>
             <a:r>
-              <a:rPr lang="en-US" smtClean="0"/>
+              <a:rPr lang="en-US"/>
               <a:t>Click to edit Master text styles</a:t>
             </a:r>
           </a:p>
           <a:p>
             <a:pPr lvl="1"/>
             <a:r>
-              <a:rPr lang="en-US" smtClean="0"/>
+              <a:rPr lang="en-US"/>
               <a:t>Second level</a:t>
             </a:r>
           </a:p>
           <a:p>
             <a:pPr lvl="2"/>
             <a:r>
-              <a:rPr lang="en-US" smtClean="0"/>
+              <a:rPr lang="en-US"/>
               <a:t>Third level</a:t>
             </a:r>
           </a:p>
           <a:p>
             <a:pPr lvl="3"/>
             <a:r>
-              <a:rPr lang="en-US" smtClean="0"/>
+              <a:rPr lang="en-US"/>
               <a:t>Fourth level</a:t>
             </a:r>
           </a:p>
           <a:p>
             <a:pPr lvl="4"/>
             <a:r>
-              <a:rPr lang="en-US" smtClean="0"/>
+              <a:rPr lang="en-US"/>
               <a:t>Fifth level</a:t>
             </a:r>
-            <a:endParaRPr lang="en-US"/>
           </a:p>
         </p:txBody>
       </p:sp>
@@ -606,10 +628,9 @@
           <a:lstStyle/>
           <a:p>
             <a:r>
-              <a:rPr lang="en-US" smtClean="0"/>
+              <a:rPr lang="en-US"/>
               <a:t>Click to edit Master title style</a:t>
             </a:r>
-            <a:endParaRPr lang="en-US"/>
           </a:p>
         </p:txBody>
       </p:sp>
@@ -725,10 +746,9 @@
           </a:lstStyle>
           <a:p>
             <a:r>
-              <a:rPr lang="en-US" smtClean="0"/>
+              <a:rPr lang="en-US"/>
               <a:t>Click to edit Master subtitle style</a:t>
             </a:r>
-            <a:endParaRPr lang="en-US"/>
           </a:p>
         </p:txBody>
       </p:sp>
@@ -750,7 +770,7 @@
             <a:fld id="{1D8BD707-D9CF-40AE-B4C6-C98DA3205C09}" type="datetimeFigureOut">
               <a:rPr lang="en-US" smtClean="0"/>
               <a:pPr/>
-              <a:t>3/11/2014</a:t>
+              <a:t>1/22/2017</a:t>
             </a:fld>
             <a:endParaRPr lang="en-US"/>
           </a:p>
@@ -840,10 +860,9 @@
           <a:lstStyle/>
           <a:p>
             <a:r>
-              <a:rPr lang="en-US" smtClean="0"/>
+              <a:rPr lang="en-US"/>
               <a:t>Click to edit Master title style</a:t>
             </a:r>
-            <a:endParaRPr lang="en-US"/>
           </a:p>
         </p:txBody>
       </p:sp>
@@ -864,38 +883,37 @@
           <a:p>
             <a:pPr lvl="0"/>
             <a:r>
-              <a:rPr lang="en-US" smtClean="0"/>
+              <a:rPr lang="en-US"/>
               <a:t>Click to edit Master text styles</a:t>
             </a:r>
           </a:p>
           <a:p>
             <a:pPr lvl="1"/>
             <a:r>
-              <a:rPr lang="en-US" smtClean="0"/>
+              <a:rPr lang="en-US"/>
               <a:t>Second level</a:t>
             </a:r>
           </a:p>
           <a:p>
             <a:pPr lvl="2"/>
             <a:r>
-              <a:rPr lang="en-US" smtClean="0"/>
+              <a:rPr lang="en-US"/>
               <a:t>Third level</a:t>
             </a:r>
           </a:p>
           <a:p>
             <a:pPr lvl="3"/>
             <a:r>
-              <a:rPr lang="en-US" smtClean="0"/>
+              <a:rPr lang="en-US"/>
               <a:t>Fourth level</a:t>
             </a:r>
           </a:p>
           <a:p>
             <a:pPr lvl="4"/>
             <a:r>
-              <a:rPr lang="en-US" smtClean="0"/>
+              <a:rPr lang="en-US"/>
               <a:t>Fifth level</a:t>
             </a:r>
-            <a:endParaRPr lang="en-US"/>
           </a:p>
         </p:txBody>
       </p:sp>
@@ -917,7 +935,7 @@
             <a:fld id="{1D8BD707-D9CF-40AE-B4C6-C98DA3205C09}" type="datetimeFigureOut">
               <a:rPr lang="en-US" smtClean="0"/>
               <a:pPr/>
-              <a:t>3/11/2014</a:t>
+              <a:t>1/22/2017</a:t>
             </a:fld>
             <a:endParaRPr lang="en-US"/>
           </a:p>
@@ -1012,10 +1030,9 @@
           <a:lstStyle/>
           <a:p>
             <a:r>
-              <a:rPr lang="en-US" smtClean="0"/>
+              <a:rPr lang="en-US"/>
               <a:t>Click to edit Master title style</a:t>
             </a:r>
-            <a:endParaRPr lang="en-US"/>
           </a:p>
         </p:txBody>
       </p:sp>
@@ -1041,38 +1058,37 @@
           <a:p>
             <a:pPr lvl="0"/>
             <a:r>
-              <a:rPr lang="en-US" smtClean="0"/>
+              <a:rPr lang="en-US"/>
               <a:t>Click to edit Master text styles</a:t>
             </a:r>
           </a:p>
           <a:p>
             <a:pPr lvl="1"/>
             <a:r>
-              <a:rPr lang="en-US" smtClean="0"/>
+              <a:rPr lang="en-US"/>
               <a:t>Second level</a:t>
             </a:r>
           </a:p>
           <a:p>
             <a:pPr lvl="2"/>
             <a:r>
-              <a:rPr lang="en-US" smtClean="0"/>
+              <a:rPr lang="en-US"/>
               <a:t>Third level</a:t>
             </a:r>
           </a:p>
           <a:p>
             <a:pPr lvl="3"/>
             <a:r>
-              <a:rPr lang="en-US" smtClean="0"/>
+              <a:rPr lang="en-US"/>
               <a:t>Fourth level</a:t>
             </a:r>
           </a:p>
           <a:p>
             <a:pPr lvl="4"/>
             <a:r>
-              <a:rPr lang="en-US" smtClean="0"/>
+              <a:rPr lang="en-US"/>
               <a:t>Fifth level</a:t>
             </a:r>
-            <a:endParaRPr lang="en-US"/>
           </a:p>
         </p:txBody>
       </p:sp>
@@ -1094,7 +1110,7 @@
             <a:fld id="{1D8BD707-D9CF-40AE-B4C6-C98DA3205C09}" type="datetimeFigureOut">
               <a:rPr lang="en-US" smtClean="0"/>
               <a:pPr/>
-              <a:t>3/11/2014</a:t>
+              <a:t>1/22/2017</a:t>
             </a:fld>
             <a:endParaRPr lang="en-US"/>
           </a:p>
@@ -1184,10 +1200,9 @@
           <a:lstStyle/>
           <a:p>
             <a:r>
-              <a:rPr lang="en-US" smtClean="0"/>
+              <a:rPr lang="en-US"/>
               <a:t>Click to edit Master title style</a:t>
             </a:r>
-            <a:endParaRPr lang="en-US"/>
           </a:p>
         </p:txBody>
       </p:sp>
@@ -1208,38 +1223,37 @@
           <a:p>
             <a:pPr lvl="0"/>
             <a:r>
-              <a:rPr lang="en-US" smtClean="0"/>
+              <a:rPr lang="en-US"/>
               <a:t>Click to edit Master text styles</a:t>
             </a:r>
           </a:p>
           <a:p>
             <a:pPr lvl="1"/>
             <a:r>
-              <a:rPr lang="en-US" smtClean="0"/>
+              <a:rPr lang="en-US"/>
               <a:t>Second level</a:t>
             </a:r>
           </a:p>
           <a:p>
             <a:pPr lvl="2"/>
             <a:r>
-              <a:rPr lang="en-US" smtClean="0"/>
+              <a:rPr lang="en-US"/>
               <a:t>Third level</a:t>
             </a:r>
           </a:p>
           <a:p>
             <a:pPr lvl="3"/>
             <a:r>
-              <a:rPr lang="en-US" smtClean="0"/>
+              <a:rPr lang="en-US"/>
               <a:t>Fourth level</a:t>
             </a:r>
           </a:p>
           <a:p>
             <a:pPr lvl="4"/>
             <a:r>
-              <a:rPr lang="en-US" smtClean="0"/>
+              <a:rPr lang="en-US"/>
               <a:t>Fifth level</a:t>
             </a:r>
-            <a:endParaRPr lang="en-US"/>
           </a:p>
         </p:txBody>
       </p:sp>
@@ -1261,7 +1275,7 @@
             <a:fld id="{1D8BD707-D9CF-40AE-B4C6-C98DA3205C09}" type="datetimeFigureOut">
               <a:rPr lang="en-US" smtClean="0"/>
               <a:pPr/>
-              <a:t>3/11/2014</a:t>
+              <a:t>1/22/2017</a:t>
             </a:fld>
             <a:endParaRPr lang="en-US"/>
           </a:p>
@@ -1360,10 +1374,9 @@
           </a:lstStyle>
           <a:p>
             <a:r>
-              <a:rPr lang="en-US" smtClean="0"/>
+              <a:rPr lang="en-US"/>
               <a:t>Click to edit Master title style</a:t>
             </a:r>
-            <a:endParaRPr lang="en-US"/>
           </a:p>
         </p:txBody>
       </p:sp>
@@ -1480,7 +1493,7 @@
           <a:p>
             <a:pPr lvl="0"/>
             <a:r>
-              <a:rPr lang="en-US" smtClean="0"/>
+              <a:rPr lang="en-US"/>
               <a:t>Click to edit Master text styles</a:t>
             </a:r>
           </a:p>
@@ -1504,7 +1517,7 @@
             <a:fld id="{1D8BD707-D9CF-40AE-B4C6-C98DA3205C09}" type="datetimeFigureOut">
               <a:rPr lang="en-US" smtClean="0"/>
               <a:pPr/>
-              <a:t>3/11/2014</a:t>
+              <a:t>1/22/2017</a:t>
             </a:fld>
             <a:endParaRPr lang="en-US"/>
           </a:p>
@@ -1594,10 +1607,9 @@
           <a:lstStyle/>
           <a:p>
             <a:r>
-              <a:rPr lang="en-US" smtClean="0"/>
+              <a:rPr lang="en-US"/>
               <a:t>Click to edit Master title style</a:t>
             </a:r>
-            <a:endParaRPr lang="en-US"/>
           </a:p>
         </p:txBody>
       </p:sp>
@@ -1651,38 +1663,37 @@
           <a:p>
             <a:pPr lvl="0"/>
             <a:r>
-              <a:rPr lang="en-US" smtClean="0"/>
+              <a:rPr lang="en-US"/>
               <a:t>Click to edit Master text styles</a:t>
             </a:r>
           </a:p>
           <a:p>
             <a:pPr lvl="1"/>
             <a:r>
-              <a:rPr lang="en-US" smtClean="0"/>
+              <a:rPr lang="en-US"/>
               <a:t>Second level</a:t>
             </a:r>
           </a:p>
           <a:p>
             <a:pPr lvl="2"/>
             <a:r>
-              <a:rPr lang="en-US" smtClean="0"/>
+              <a:rPr lang="en-US"/>
               <a:t>Third level</a:t>
             </a:r>
           </a:p>
           <a:p>
             <a:pPr lvl="3"/>
             <a:r>
-              <a:rPr lang="en-US" smtClean="0"/>
+              <a:rPr lang="en-US"/>
               <a:t>Fourth level</a:t>
             </a:r>
           </a:p>
           <a:p>
             <a:pPr lvl="4"/>
             <a:r>
-              <a:rPr lang="en-US" smtClean="0"/>
+              <a:rPr lang="en-US"/>
               <a:t>Fifth level</a:t>
             </a:r>
-            <a:endParaRPr lang="en-US"/>
           </a:p>
         </p:txBody>
       </p:sp>
@@ -1736,38 +1747,37 @@
           <a:p>
             <a:pPr lvl="0"/>
             <a:r>
-              <a:rPr lang="en-US" smtClean="0"/>
+              <a:rPr lang="en-US"/>
               <a:t>Click to edit Master text styles</a:t>
             </a:r>
           </a:p>
           <a:p>
             <a:pPr lvl="1"/>
             <a:r>
-              <a:rPr lang="en-US" smtClean="0"/>
+              <a:rPr lang="en-US"/>
               <a:t>Second level</a:t>
             </a:r>
           </a:p>
           <a:p>
             <a:pPr lvl="2"/>
             <a:r>
-              <a:rPr lang="en-US" smtClean="0"/>
+              <a:rPr lang="en-US"/>
               <a:t>Third level</a:t>
             </a:r>
           </a:p>
           <a:p>
             <a:pPr lvl="3"/>
             <a:r>
-              <a:rPr lang="en-US" smtClean="0"/>
+              <a:rPr lang="en-US"/>
               <a:t>Fourth level</a:t>
             </a:r>
           </a:p>
           <a:p>
             <a:pPr lvl="4"/>
             <a:r>
-              <a:rPr lang="en-US" smtClean="0"/>
+              <a:rPr lang="en-US"/>
               <a:t>Fifth level</a:t>
             </a:r>
-            <a:endParaRPr lang="en-US"/>
           </a:p>
         </p:txBody>
       </p:sp>
@@ -1789,7 +1799,7 @@
             <a:fld id="{1D8BD707-D9CF-40AE-B4C6-C98DA3205C09}" type="datetimeFigureOut">
               <a:rPr lang="en-US" smtClean="0"/>
               <a:pPr/>
-              <a:t>3/11/2014</a:t>
+              <a:t>1/22/2017</a:t>
             </a:fld>
             <a:endParaRPr lang="en-US"/>
           </a:p>
@@ -1883,10 +1893,9 @@
           </a:lstStyle>
           <a:p>
             <a:r>
-              <a:rPr lang="en-US" smtClean="0"/>
+              <a:rPr lang="en-US"/>
               <a:t>Click to edit Master title style</a:t>
             </a:r>
-            <a:endParaRPr lang="en-US"/>
           </a:p>
         </p:txBody>
       </p:sp>
@@ -1949,7 +1958,7 @@
           <a:p>
             <a:pPr lvl="0"/>
             <a:r>
-              <a:rPr lang="en-US" smtClean="0"/>
+              <a:rPr lang="en-US"/>
               <a:t>Click to edit Master text styles</a:t>
             </a:r>
           </a:p>
@@ -2005,38 +2014,37 @@
           <a:p>
             <a:pPr lvl="0"/>
             <a:r>
-              <a:rPr lang="en-US" smtClean="0"/>
+              <a:rPr lang="en-US"/>
               <a:t>Click to edit Master text styles</a:t>
             </a:r>
           </a:p>
           <a:p>
             <a:pPr lvl="1"/>
             <a:r>
-              <a:rPr lang="en-US" smtClean="0"/>
+              <a:rPr lang="en-US"/>
               <a:t>Second level</a:t>
             </a:r>
           </a:p>
           <a:p>
             <a:pPr lvl="2"/>
             <a:r>
-              <a:rPr lang="en-US" smtClean="0"/>
+              <a:rPr lang="en-US"/>
               <a:t>Third level</a:t>
             </a:r>
           </a:p>
           <a:p>
             <a:pPr lvl="3"/>
             <a:r>
-              <a:rPr lang="en-US" smtClean="0"/>
+              <a:rPr lang="en-US"/>
               <a:t>Fourth level</a:t>
             </a:r>
           </a:p>
           <a:p>
             <a:pPr lvl="4"/>
             <a:r>
-              <a:rPr lang="en-US" smtClean="0"/>
+              <a:rPr lang="en-US"/>
               <a:t>Fifth level</a:t>
             </a:r>
-            <a:endParaRPr lang="en-US"/>
           </a:p>
         </p:txBody>
       </p:sp>
@@ -2099,7 +2107,7 @@
           <a:p>
             <a:pPr lvl="0"/>
             <a:r>
-              <a:rPr lang="en-US" smtClean="0"/>
+              <a:rPr lang="en-US"/>
               <a:t>Click to edit Master text styles</a:t>
             </a:r>
           </a:p>
@@ -2155,38 +2163,37 @@
           <a:p>
             <a:pPr lvl="0"/>
             <a:r>
-              <a:rPr lang="en-US" smtClean="0"/>
+              <a:rPr lang="en-US"/>
               <a:t>Click to edit Master text styles</a:t>
             </a:r>
           </a:p>
           <a:p>
             <a:pPr lvl="1"/>
             <a:r>
-              <a:rPr lang="en-US" smtClean="0"/>
+              <a:rPr lang="en-US"/>
               <a:t>Second level</a:t>
             </a:r>
           </a:p>
           <a:p>
             <a:pPr lvl="2"/>
             <a:r>
-              <a:rPr lang="en-US" smtClean="0"/>
+              <a:rPr lang="en-US"/>
               <a:t>Third level</a:t>
             </a:r>
           </a:p>
           <a:p>
             <a:pPr lvl="3"/>
             <a:r>
-              <a:rPr lang="en-US" smtClean="0"/>
+              <a:rPr lang="en-US"/>
               <a:t>Fourth level</a:t>
             </a:r>
           </a:p>
           <a:p>
             <a:pPr lvl="4"/>
             <a:r>
-              <a:rPr lang="en-US" smtClean="0"/>
+              <a:rPr lang="en-US"/>
               <a:t>Fifth level</a:t>
             </a:r>
-            <a:endParaRPr lang="en-US"/>
           </a:p>
         </p:txBody>
       </p:sp>
@@ -2208,7 +2215,7 @@
             <a:fld id="{1D8BD707-D9CF-40AE-B4C6-C98DA3205C09}" type="datetimeFigureOut">
               <a:rPr lang="en-US" smtClean="0"/>
               <a:pPr/>
-              <a:t>3/11/2014</a:t>
+              <a:t>1/22/2017</a:t>
             </a:fld>
             <a:endParaRPr lang="en-US"/>
           </a:p>
@@ -2298,10 +2305,9 @@
           <a:lstStyle/>
           <a:p>
             <a:r>
-              <a:rPr lang="en-US" smtClean="0"/>
+              <a:rPr lang="en-US"/>
               <a:t>Click to edit Master title style</a:t>
             </a:r>
-            <a:endParaRPr lang="en-US"/>
           </a:p>
         </p:txBody>
       </p:sp>
@@ -2323,7 +2329,7 @@
             <a:fld id="{1D8BD707-D9CF-40AE-B4C6-C98DA3205C09}" type="datetimeFigureOut">
               <a:rPr lang="en-US" smtClean="0"/>
               <a:pPr/>
-              <a:t>3/11/2014</a:t>
+              <a:t>1/22/2017</a:t>
             </a:fld>
             <a:endParaRPr lang="en-US"/>
           </a:p>
@@ -2415,7 +2421,7 @@
             <a:fld id="{1D8BD707-D9CF-40AE-B4C6-C98DA3205C09}" type="datetimeFigureOut">
               <a:rPr lang="en-US" smtClean="0"/>
               <a:pPr/>
-              <a:t>3/11/2014</a:t>
+              <a:t>1/22/2017</a:t>
             </a:fld>
             <a:endParaRPr lang="en-US"/>
           </a:p>
@@ -2514,10 +2520,9 @@
           </a:lstStyle>
           <a:p>
             <a:r>
-              <a:rPr lang="en-US" smtClean="0"/>
+              <a:rPr lang="en-US"/>
               <a:t>Click to edit Master title style</a:t>
             </a:r>
-            <a:endParaRPr lang="en-US"/>
           </a:p>
         </p:txBody>
       </p:sp>
@@ -2571,38 +2576,37 @@
           <a:p>
             <a:pPr lvl="0"/>
             <a:r>
-              <a:rPr lang="en-US" smtClean="0"/>
+              <a:rPr lang="en-US"/>
               <a:t>Click to edit Master text styles</a:t>
             </a:r>
           </a:p>
           <a:p>
             <a:pPr lvl="1"/>
             <a:r>
-              <a:rPr lang="en-US" smtClean="0"/>
+              <a:rPr lang="en-US"/>
               <a:t>Second level</a:t>
             </a:r>
           </a:p>
           <a:p>
             <a:pPr lvl="2"/>
             <a:r>
-              <a:rPr lang="en-US" smtClean="0"/>
+              <a:rPr lang="en-US"/>
               <a:t>Third level</a:t>
             </a:r>
           </a:p>
           <a:p>
             <a:pPr lvl="3"/>
             <a:r>
-              <a:rPr lang="en-US" smtClean="0"/>
+              <a:rPr lang="en-US"/>
               <a:t>Fourth level</a:t>
             </a:r>
           </a:p>
           <a:p>
             <a:pPr lvl="4"/>
             <a:r>
-              <a:rPr lang="en-US" smtClean="0"/>
+              <a:rPr lang="en-US"/>
               <a:t>Fifth level</a:t>
             </a:r>
-            <a:endParaRPr lang="en-US"/>
           </a:p>
         </p:txBody>
       </p:sp>
@@ -2665,7 +2669,7 @@
           <a:p>
             <a:pPr lvl="0"/>
             <a:r>
-              <a:rPr lang="en-US" smtClean="0"/>
+              <a:rPr lang="en-US"/>
               <a:t>Click to edit Master text styles</a:t>
             </a:r>
           </a:p>
@@ -2689,7 +2693,7 @@
             <a:fld id="{1D8BD707-D9CF-40AE-B4C6-C98DA3205C09}" type="datetimeFigureOut">
               <a:rPr lang="en-US" smtClean="0"/>
               <a:pPr/>
-              <a:t>3/11/2014</a:t>
+              <a:t>1/22/2017</a:t>
             </a:fld>
             <a:endParaRPr lang="en-US"/>
           </a:p>
@@ -2788,10 +2792,9 @@
           </a:lstStyle>
           <a:p>
             <a:r>
-              <a:rPr lang="en-US" smtClean="0"/>
+              <a:rPr lang="en-US"/>
               <a:t>Click to edit Master title style</a:t>
             </a:r>
-            <a:endParaRPr lang="en-US"/>
           </a:p>
         </p:txBody>
       </p:sp>
@@ -2915,7 +2918,7 @@
           <a:p>
             <a:pPr lvl="0"/>
             <a:r>
-              <a:rPr lang="en-US" smtClean="0"/>
+              <a:rPr lang="en-US"/>
               <a:t>Click to edit Master text styles</a:t>
             </a:r>
           </a:p>
@@ -2939,7 +2942,7 @@
             <a:fld id="{1D8BD707-D9CF-40AE-B4C6-C98DA3205C09}" type="datetimeFigureOut">
               <a:rPr lang="en-US" smtClean="0"/>
               <a:pPr/>
-              <a:t>3/11/2014</a:t>
+              <a:t>1/22/2017</a:t>
             </a:fld>
             <a:endParaRPr lang="en-US"/>
           </a:p>
@@ -3044,10 +3047,9 @@
           <a:lstStyle/>
           <a:p>
             <a:r>
-              <a:rPr lang="en-US" smtClean="0"/>
+              <a:rPr lang="en-US"/>
               <a:t>Click to edit Master title style</a:t>
             </a:r>
-            <a:endParaRPr lang="en-US"/>
           </a:p>
         </p:txBody>
       </p:sp>
@@ -3078,38 +3080,37 @@
           <a:p>
             <a:pPr lvl="0"/>
             <a:r>
-              <a:rPr lang="en-US" smtClean="0"/>
+              <a:rPr lang="en-US"/>
               <a:t>Click to edit Master text styles</a:t>
             </a:r>
           </a:p>
           <a:p>
             <a:pPr lvl="1"/>
             <a:r>
-              <a:rPr lang="en-US" smtClean="0"/>
+              <a:rPr lang="en-US"/>
               <a:t>Second level</a:t>
             </a:r>
           </a:p>
           <a:p>
             <a:pPr lvl="2"/>
             <a:r>
-              <a:rPr lang="en-US" smtClean="0"/>
+              <a:rPr lang="en-US"/>
               <a:t>Third level</a:t>
             </a:r>
           </a:p>
           <a:p>
             <a:pPr lvl="3"/>
             <a:r>
-              <a:rPr lang="en-US" smtClean="0"/>
+              <a:rPr lang="en-US"/>
               <a:t>Fourth level</a:t>
             </a:r>
           </a:p>
           <a:p>
             <a:pPr lvl="4"/>
             <a:r>
-              <a:rPr lang="en-US" smtClean="0"/>
+              <a:rPr lang="en-US"/>
               <a:t>Fifth level</a:t>
             </a:r>
-            <a:endParaRPr lang="en-US"/>
           </a:p>
         </p:txBody>
       </p:sp>
@@ -3149,7 +3150,7 @@
             <a:fld id="{1D8BD707-D9CF-40AE-B4C6-C98DA3205C09}" type="datetimeFigureOut">
               <a:rPr lang="en-US" smtClean="0"/>
               <a:pPr/>
-              <a:t>3/11/2014</a:t>
+              <a:t>1/22/2017</a:t>
             </a:fld>
             <a:endParaRPr lang="en-US"/>
           </a:p>
@@ -3715,7 +3716,7 @@
             <a:lstStyle/>
             <a:p>
               <a:r>
-                <a:rPr lang="en-US" sz="3200" spc="-200" dirty="0" smtClean="0">
+                <a:rPr lang="en-US" sz="3200" spc="-200" dirty="0">
                   <a:solidFill>
                     <a:srgbClr val="FF6600"/>
                   </a:solidFill>
@@ -3749,7 +3750,7 @@
             <a:p>
               <a:pPr lvl="0"/>
               <a:r>
-                <a:rPr lang="en-US" sz="4800" b="1" spc="200" dirty="0" smtClean="0">
+                <a:rPr lang="en-US" sz="4800" b="1" spc="200" dirty="0">
                   <a:solidFill>
                     <a:srgbClr val="0070C0"/>
                   </a:solidFill>
@@ -3757,12 +3758,6 @@
                 </a:rPr>
                 <a:t>Labs</a:t>
               </a:r>
-              <a:endParaRPr lang="en-US" sz="4800" b="1" spc="200" dirty="0">
-                <a:solidFill>
-                  <a:srgbClr val="0070C0"/>
-                </a:solidFill>
-                <a:latin typeface="Gill Sans Ultra Bold" pitchFamily="34" charset="0"/>
-              </a:endParaRPr>
             </a:p>
           </p:txBody>
         </p:sp>
@@ -3809,14 +3804,11 @@
             <a:p>
               <a:pPr marL="57150" indent="57150"/>
               <a:r>
-                <a:rPr lang="en-US" b="1" dirty="0" smtClean="0">
+                <a:rPr lang="en-US" b="1" dirty="0">
                   <a:latin typeface="Franklin Gothic Book" pitchFamily="34" charset="0"/>
                 </a:rPr>
                 <a:t>slide added by</a:t>
               </a:r>
-              <a:endParaRPr lang="en-US" b="1" dirty="0">
-                <a:latin typeface="Franklin Gothic Book" pitchFamily="34" charset="0"/>
-              </a:endParaRPr>
             </a:p>
           </p:txBody>
         </p:sp>
@@ -3844,10 +3836,9 @@
           <a:lstStyle/>
           <a:p>
             <a:r>
-              <a:rPr lang="en-US" dirty="0" smtClean="0"/>
+              <a:rPr lang="en-US" dirty="0"/>
               <a:t>Slightly transparent version, to be used in the plugin</a:t>
             </a:r>
-            <a:endParaRPr lang="en-US" dirty="0"/>
           </a:p>
         </p:txBody>
       </p:sp>
@@ -3875,10 +3866,9 @@
           <a:p>
             <a:pPr algn="r"/>
             <a:r>
-              <a:rPr lang="en-US" dirty="0" smtClean="0"/>
+              <a:rPr lang="en-US" dirty="0"/>
               <a:t>Source object</a:t>
             </a:r>
-            <a:endParaRPr lang="en-US" dirty="0"/>
           </a:p>
         </p:txBody>
       </p:sp>
@@ -3956,13 +3946,6 @@
   <p:clrMapOvr>
     <a:masterClrMapping/>
   </p:clrMapOvr>
-  <p:timing>
-    <p:tnLst>
-      <p:par>
-        <p:cTn id="1" dur="indefinite" restart="never" nodeType="tmRoot"/>
-      </p:par>
-    </p:tnLst>
-  </p:timing>
 </p:sld>
 </file>
 
@@ -3983,177 +3966,299 @@
           <a:chExt cx="0" cy="0"/>
         </a:xfrm>
       </p:grpSpPr>
-      <p:sp>
-        <p:nvSpPr>
-          <p:cNvPr id="4" name="Rounded Rectangle 3"/>
-          <p:cNvSpPr/>
+      <p:grpSp>
+        <p:nvGrpSpPr>
+          <p:cNvPr id="9" name="Group 34"/>
+          <p:cNvGrpSpPr/>
           <p:nvPr/>
-        </p:nvSpPr>
-        <p:spPr>
+        </p:nvGrpSpPr>
+        <p:grpSpPr>
           <a:xfrm>
-            <a:off x="762000" y="1011382"/>
-            <a:ext cx="7848600" cy="4876800"/>
+            <a:off x="419100" y="1257301"/>
+            <a:ext cx="8305800" cy="4343399"/>
+            <a:chOff x="381000" y="1600200"/>
+            <a:chExt cx="8305800" cy="4343399"/>
           </a:xfrm>
-          <a:prstGeom prst="roundRect">
-            <a:avLst>
-              <a:gd name="adj" fmla="val 5303"/>
-            </a:avLst>
-          </a:prstGeom>
-          <a:solidFill>
-            <a:srgbClr val="0070C0"/>
-          </a:solidFill>
-        </p:spPr>
-        <p:style>
-          <a:lnRef idx="2">
-            <a:schemeClr val="accent1">
-              <a:shade val="50000"/>
-            </a:schemeClr>
-          </a:lnRef>
-          <a:fillRef idx="1">
-            <a:schemeClr val="accent1"/>
-          </a:fillRef>
-          <a:effectRef idx="0">
-            <a:schemeClr val="accent1"/>
-          </a:effectRef>
-          <a:fontRef idx="minor">
-            <a:schemeClr val="lt1"/>
-          </a:fontRef>
-        </p:style>
-        <p:txBody>
-          <a:bodyPr rtlCol="0" anchor="ctr"/>
-          <a:lstStyle/>
-          <a:p>
-            <a:pPr algn="ctr"/>
-            <a:r>
-              <a:rPr lang="en-US" sz="3200" b="1" dirty="0" smtClean="0"/>
-              <a:t>ACKNOWLEDGEMENT</a:t>
-            </a:r>
-            <a:endParaRPr lang="en-US" sz="3200" b="1" dirty="0" smtClean="0"/>
-          </a:p>
-          <a:p>
-            <a:pPr algn="ctr"/>
-            <a:endParaRPr lang="en-US" dirty="0" smtClean="0"/>
-          </a:p>
-          <a:p>
-            <a:pPr algn="ctr"/>
-            <a:endParaRPr lang="en-US" dirty="0"/>
-          </a:p>
-          <a:p>
-            <a:pPr algn="ctr"/>
-            <a:r>
-              <a:rPr lang="en-US" sz="2400" dirty="0" smtClean="0"/>
-              <a:t>This presentation benefitted from </a:t>
-            </a:r>
-            <a:br>
-              <a:rPr lang="en-US" sz="2400" dirty="0" smtClean="0"/>
-            </a:br>
-            <a:r>
-              <a:rPr lang="en-US" sz="5400" b="1" dirty="0" err="1" smtClean="0"/>
-              <a:t>PowerPointLabs</a:t>
-            </a:r>
-            <a:r>
-              <a:rPr lang="en-US" sz="2400" dirty="0" smtClean="0"/>
-              <a:t> </a:t>
-            </a:r>
-            <a:br>
-              <a:rPr lang="en-US" sz="2400" dirty="0" smtClean="0"/>
-            </a:br>
-            <a:r>
-              <a:rPr lang="en-US" sz="2400" dirty="0" smtClean="0"/>
-              <a:t>a </a:t>
-            </a:r>
-            <a:r>
-              <a:rPr lang="en-US" sz="2400" dirty="0" smtClean="0"/>
-              <a:t>PowerPoint </a:t>
-            </a:r>
-            <a:r>
-              <a:rPr lang="en-US" sz="2400" dirty="0" smtClean="0"/>
-              <a:t>plugin for </a:t>
-            </a:r>
-            <a:r>
-              <a:rPr lang="en-US" sz="2400" dirty="0" smtClean="0">
+        </p:grpSpPr>
+        <p:sp>
+          <p:nvSpPr>
+            <p:cNvPr id="10" name="Rectangle 9"/>
+            <p:cNvSpPr/>
+            <p:nvPr/>
+          </p:nvSpPr>
+          <p:spPr>
+            <a:xfrm>
+              <a:off x="381000" y="1600200"/>
+              <a:ext cx="8305800" cy="685800"/>
+            </a:xfrm>
+            <a:prstGeom prst="rect">
+              <a:avLst/>
+            </a:prstGeom>
+            <a:solidFill>
+              <a:schemeClr val="tx1"/>
+            </a:solidFill>
+            <a:ln>
+              <a:solidFill>
+                <a:schemeClr val="tx1"/>
+              </a:solidFill>
+            </a:ln>
+          </p:spPr>
+          <p:style>
+            <a:lnRef idx="2">
+              <a:schemeClr val="accent1">
+                <a:shade val="50000"/>
+              </a:schemeClr>
+            </a:lnRef>
+            <a:fillRef idx="1">
+              <a:schemeClr val="accent1"/>
+            </a:fillRef>
+            <a:effectRef idx="0">
+              <a:schemeClr val="accent1"/>
+            </a:effectRef>
+            <a:fontRef idx="minor">
+              <a:schemeClr val="lt1"/>
+            </a:fontRef>
+          </p:style>
+          <p:txBody>
+            <a:bodyPr rtlCol="0" anchor="ctr"/>
+            <a:lstStyle/>
+            <a:p>
+              <a:pPr algn="ctr"/>
+              <a:r>
+                <a:rPr lang="en-US" sz="3200" b="1" dirty="0">
+                  <a:latin typeface="Franklin Gothic Demi" panose="020B0703020102020204" pitchFamily="34" charset="0"/>
+                </a:rPr>
+                <a:t>ACKNOWLEDGEMENT</a:t>
+              </a:r>
+            </a:p>
+          </p:txBody>
+        </p:sp>
+        <p:sp>
+          <p:nvSpPr>
+            <p:cNvPr id="11" name="Rectangle 10"/>
+            <p:cNvSpPr/>
+            <p:nvPr/>
+          </p:nvSpPr>
+          <p:spPr>
+            <a:xfrm>
+              <a:off x="381000" y="2289698"/>
+              <a:ext cx="8305800" cy="3653901"/>
+            </a:xfrm>
+            <a:prstGeom prst="rect">
+              <a:avLst/>
+            </a:prstGeom>
+            <a:solidFill>
+              <a:schemeClr val="bg1"/>
+            </a:solidFill>
+            <a:ln>
+              <a:solidFill>
+                <a:schemeClr val="tx1"/>
+              </a:solidFill>
+            </a:ln>
+          </p:spPr>
+          <p:style>
+            <a:lnRef idx="2">
+              <a:schemeClr val="accent1">
+                <a:shade val="50000"/>
+              </a:schemeClr>
+            </a:lnRef>
+            <a:fillRef idx="1">
+              <a:schemeClr val="accent1"/>
+            </a:fillRef>
+            <a:effectRef idx="0">
+              <a:schemeClr val="accent1"/>
+            </a:effectRef>
+            <a:fontRef idx="minor">
+              <a:schemeClr val="lt1"/>
+            </a:fontRef>
+          </p:style>
+          <p:txBody>
+            <a:bodyPr rtlCol="0" anchor="ctr"/>
+            <a:lstStyle/>
+            <a:p>
+              <a:pPr algn="ctr"/>
+              <a:r>
+                <a:rPr lang="en-US" sz="2400" b="1" dirty="0">
+                  <a:solidFill>
+                    <a:schemeClr val="tx1"/>
+                  </a:solidFill>
+                  <a:latin typeface="Segoe UI" panose="020B0502040204020203" pitchFamily="34" charset="0"/>
+                  <a:cs typeface="Segoe UI" panose="020B0502040204020203" pitchFamily="34" charset="0"/>
+                </a:rPr>
+                <a:t>This presentation benefitted from</a:t>
+              </a:r>
+            </a:p>
+            <a:p>
+              <a:pPr algn="ctr"/>
+              <a:r>
+                <a:rPr lang="en-US" sz="2400" b="1" dirty="0" err="1">
+                  <a:solidFill>
+                    <a:schemeClr val="tx1"/>
+                  </a:solidFill>
+                  <a:latin typeface="Segoe UI" panose="020B0502040204020203" pitchFamily="34" charset="0"/>
+                  <a:cs typeface="Segoe UI" panose="020B0502040204020203" pitchFamily="34" charset="0"/>
+                </a:rPr>
+                <a:t>PowerPointLabs</a:t>
+              </a:r>
+              <a:endParaRPr lang="en-US" sz="2400" b="1" dirty="0">
                 <a:solidFill>
-                  <a:schemeClr val="bg1"/>
+                  <a:schemeClr val="tx1"/>
                 </a:solidFill>
-              </a:rPr>
-              <a:t>creating</a:t>
-            </a:r>
-            <a:r>
-              <a:rPr lang="en-US" sz="2400" dirty="0" smtClean="0"/>
-              <a:t> </a:t>
-            </a:r>
-            <a:br>
-              <a:rPr lang="en-US" sz="2400" dirty="0" smtClean="0"/>
-            </a:br>
-            <a:r>
-              <a:rPr lang="en-US" sz="2800" dirty="0" smtClean="0">
-                <a:solidFill>
-                  <a:srgbClr val="FFFF00"/>
-                </a:solidFill>
-              </a:rPr>
-              <a:t>better presentations with less effort</a:t>
-            </a:r>
-            <a:r>
-              <a:rPr lang="en-US" sz="2400" dirty="0" smtClean="0"/>
-              <a:t>. </a:t>
-            </a:r>
-          </a:p>
-          <a:p>
-            <a:pPr algn="ctr"/>
-            <a:endParaRPr lang="en-US" sz="2400" dirty="0"/>
-          </a:p>
-          <a:p>
-            <a:pPr algn="ctr"/>
-            <a:r>
-              <a:rPr lang="en-US" sz="2800" dirty="0" err="1" smtClean="0"/>
-              <a:t>PowerPointLabs</a:t>
-            </a:r>
-            <a:r>
-              <a:rPr lang="en-US" sz="2400" dirty="0" smtClean="0"/>
-              <a:t> </a:t>
-            </a:r>
-            <a:br>
-              <a:rPr lang="en-US" sz="2400" dirty="0" smtClean="0"/>
-            </a:br>
-            <a:r>
-              <a:rPr lang="en-US" sz="2800" dirty="0" smtClean="0"/>
-              <a:t>is </a:t>
-            </a:r>
-            <a:r>
-              <a:rPr lang="en-US" sz="2800" dirty="0" smtClean="0">
-                <a:solidFill>
-                  <a:srgbClr val="FFFF00"/>
-                </a:solidFill>
-              </a:rPr>
-              <a:t>available for free </a:t>
-            </a:r>
-            <a:r>
-              <a:rPr lang="en-US" sz="2800" dirty="0" smtClean="0"/>
-              <a:t>at</a:t>
-            </a:r>
-            <a:br>
-              <a:rPr lang="en-US" sz="2800" dirty="0" smtClean="0"/>
-            </a:br>
-            <a:r>
-              <a:rPr lang="en-US" sz="2400" dirty="0" smtClean="0"/>
-              <a:t> </a:t>
-            </a:r>
-            <a:r>
-              <a:rPr lang="en-US" sz="3200" b="1" dirty="0" smtClean="0">
-                <a:solidFill>
-                  <a:srgbClr val="FFFF00"/>
-                </a:solidFill>
-              </a:rPr>
-              <a:t>http://PowerPointLabs.info </a:t>
-            </a:r>
-            <a:endParaRPr lang="en-US" sz="3200" b="1" dirty="0">
+                <a:latin typeface="Segoe UI" panose="020B0502040204020203" pitchFamily="34" charset="0"/>
+                <a:cs typeface="Segoe UI" panose="020B0502040204020203" pitchFamily="34" charset="0"/>
+              </a:endParaRPr>
+            </a:p>
+            <a:p>
+              <a:pPr algn="ctr"/>
+              <a:r>
+                <a:rPr lang="en-US" sz="2400" b="1" dirty="0">
+                  <a:solidFill>
+                    <a:schemeClr val="tx1"/>
+                  </a:solidFill>
+                  <a:latin typeface="Segoe UI" panose="020B0502040204020203" pitchFamily="34" charset="0"/>
+                  <a:cs typeface="Segoe UI" panose="020B0502040204020203" pitchFamily="34" charset="0"/>
+                </a:rPr>
+                <a:t>a PowerPoint plugin for creating</a:t>
+              </a:r>
+            </a:p>
+            <a:p>
+              <a:pPr algn="ctr"/>
+              <a:r>
+                <a:rPr lang="en-US" sz="2400" b="1" dirty="0">
+                  <a:solidFill>
+                    <a:srgbClr val="FF6600"/>
+                  </a:solidFill>
+                  <a:latin typeface="Segoe UI" panose="020B0502040204020203" pitchFamily="34" charset="0"/>
+                  <a:cs typeface="Segoe UI" panose="020B0502040204020203" pitchFamily="34" charset="0"/>
+                </a:rPr>
+                <a:t>better presentations</a:t>
+              </a:r>
+              <a:r>
+                <a:rPr lang="en-US" sz="2400" b="1" dirty="0">
+                  <a:solidFill>
+                    <a:schemeClr val="tx1"/>
+                  </a:solidFill>
+                  <a:latin typeface="Segoe UI" panose="020B0502040204020203" pitchFamily="34" charset="0"/>
+                  <a:cs typeface="Segoe UI" panose="020B0502040204020203" pitchFamily="34" charset="0"/>
+                </a:rPr>
+                <a:t> with </a:t>
+              </a:r>
+              <a:r>
+                <a:rPr lang="en-US" sz="2400" b="1" dirty="0">
+                  <a:solidFill>
+                    <a:srgbClr val="FF6600"/>
+                  </a:solidFill>
+                  <a:latin typeface="Segoe UI" panose="020B0502040204020203" pitchFamily="34" charset="0"/>
+                  <a:cs typeface="Segoe UI" panose="020B0502040204020203" pitchFamily="34" charset="0"/>
+                </a:rPr>
+                <a:t>less effort</a:t>
+              </a:r>
+              <a:r>
+                <a:rPr lang="en-US" sz="2400" b="1" dirty="0">
+                  <a:solidFill>
+                    <a:schemeClr val="tx1"/>
+                  </a:solidFill>
+                  <a:latin typeface="Segoe UI" panose="020B0502040204020203" pitchFamily="34" charset="0"/>
+                  <a:cs typeface="Segoe UI" panose="020B0502040204020203" pitchFamily="34" charset="0"/>
+                </a:rPr>
+                <a:t>.</a:t>
+              </a:r>
+            </a:p>
+          </p:txBody>
+        </p:sp>
+        <p:pic>
+          <p:nvPicPr>
+            <p:cNvPr id="12" name="Picture 11"/>
+            <p:cNvPicPr>
+              <a:picLocks noChangeAspect="1"/>
+            </p:cNvPicPr>
+            <p:nvPr/>
+          </p:nvPicPr>
+          <p:blipFill>
+            <a:blip r:embed="rId2" cstate="print">
+              <a:extLst>
+                <a:ext uri="{28A0092B-C50C-407E-A947-70E740481C1C}">
+                  <a14:useLocalDpi xmlns:a14="http://schemas.microsoft.com/office/drawing/2010/main" val="0"/>
+                </a:ext>
+              </a:extLst>
+            </a:blip>
+            <a:stretch>
+              <a:fillRect/>
+            </a:stretch>
+          </p:blipFill>
+          <p:spPr>
+            <a:xfrm>
+              <a:off x="3252692" y="2528512"/>
+              <a:ext cx="2562416" cy="671888"/>
+            </a:xfrm>
+            <a:prstGeom prst="rect">
+              <a:avLst/>
+            </a:prstGeom>
+          </p:spPr>
+        </p:pic>
+        <p:sp>
+          <p:nvSpPr>
+            <p:cNvPr id="13" name="Rectangle 12"/>
+            <p:cNvSpPr/>
+            <p:nvPr/>
+          </p:nvSpPr>
+          <p:spPr>
+            <a:xfrm>
+              <a:off x="381000" y="5257799"/>
+              <a:ext cx="8305800" cy="685800"/>
+            </a:xfrm>
+            <a:prstGeom prst="rect">
+              <a:avLst/>
+            </a:prstGeom>
+            <a:solidFill>
+              <a:schemeClr val="tx1"/>
+            </a:solidFill>
+            <a:ln>
               <a:solidFill>
-                <a:srgbClr val="FFFF00"/>
+                <a:schemeClr val="tx1"/>
               </a:solidFill>
-            </a:endParaRPr>
-          </a:p>
-        </p:txBody>
-      </p:sp>
+            </a:ln>
+          </p:spPr>
+          <p:style>
+            <a:lnRef idx="2">
+              <a:schemeClr val="accent1">
+                <a:shade val="50000"/>
+              </a:schemeClr>
+            </a:lnRef>
+            <a:fillRef idx="1">
+              <a:schemeClr val="accent1"/>
+            </a:fillRef>
+            <a:effectRef idx="0">
+              <a:schemeClr val="accent1"/>
+            </a:effectRef>
+            <a:fontRef idx="minor">
+              <a:schemeClr val="lt1"/>
+            </a:fontRef>
+          </p:style>
+          <p:txBody>
+            <a:bodyPr rtlCol="0" anchor="ctr"/>
+            <a:lstStyle/>
+            <a:p>
+              <a:pPr algn="ctr"/>
+              <a:r>
+                <a:rPr lang="en-US" sz="2800" b="1" dirty="0">
+                  <a:latin typeface="Franklin Gothic Demi" panose="020B0703020102020204" pitchFamily="34" charset="0"/>
+                </a:rPr>
+                <a:t>Available for free at </a:t>
+              </a:r>
+              <a:r>
+                <a:rPr lang="en-US" sz="2800" b="1" dirty="0">
+                  <a:solidFill>
+                    <a:srgbClr val="FF6600"/>
+                  </a:solidFill>
+                  <a:latin typeface="Franklin Gothic Demi" panose="020B0703020102020204" pitchFamily="34" charset="0"/>
+                </a:rPr>
+                <a:t>http://PowerPointLabs.info</a:t>
+              </a:r>
+            </a:p>
+          </p:txBody>
+        </p:sp>
+      </p:grpSp>
     </p:spTree>
     <p:extLst>
       <p:ext uri="{BB962C8B-B14F-4D97-AF65-F5344CB8AC3E}">

</xml_diff>